<commit_message>
push in some updated slides for OAuth, more detail.
</commit_message>
<xml_diff>
--- a/docs/slides/11-PrivacyLaw.pptx
+++ b/docs/slides/11-PrivacyLaw.pptx
@@ -238,7 +238,7 @@
           <a:p>
             <a:fld id="{8F056EA2-8B1B-C340-B660-BC2CADC569EB}" type="datetimeFigureOut">
               <a:rPr lang="en-US" smtClean="0"/>
-              <a:t>11/8/23</a:t>
+              <a:t>8/15/25</a:t>
             </a:fld>
             <a:endParaRPr lang="en-US"/>
           </a:p>
@@ -1668,7 +1668,7 @@
           <a:p>
             <a:fld id="{19A37E14-C902-8243-905A-238D1EC85CD8}" type="datetimeFigureOut">
               <a:rPr lang="en-US" smtClean="0"/>
-              <a:t>11/8/23</a:t>
+              <a:t>8/15/25</a:t>
             </a:fld>
             <a:endParaRPr lang="en-US"/>
           </a:p>
@@ -1866,7 +1866,7 @@
           <a:p>
             <a:fld id="{19A37E14-C902-8243-905A-238D1EC85CD8}" type="datetimeFigureOut">
               <a:rPr lang="en-US" smtClean="0"/>
-              <a:t>11/8/23</a:t>
+              <a:t>8/15/25</a:t>
             </a:fld>
             <a:endParaRPr lang="en-US"/>
           </a:p>
@@ -2074,7 +2074,7 @@
           <a:p>
             <a:fld id="{19A37E14-C902-8243-905A-238D1EC85CD8}" type="datetimeFigureOut">
               <a:rPr lang="en-US" smtClean="0"/>
-              <a:t>11/8/23</a:t>
+              <a:t>8/15/25</a:t>
             </a:fld>
             <a:endParaRPr lang="en-US"/>
           </a:p>
@@ -2272,7 +2272,7 @@
           <a:p>
             <a:fld id="{19A37E14-C902-8243-905A-238D1EC85CD8}" type="datetimeFigureOut">
               <a:rPr lang="en-US" smtClean="0"/>
-              <a:t>11/8/23</a:t>
+              <a:t>8/15/25</a:t>
             </a:fld>
             <a:endParaRPr lang="en-US"/>
           </a:p>
@@ -2547,7 +2547,7 @@
           <a:p>
             <a:fld id="{19A37E14-C902-8243-905A-238D1EC85CD8}" type="datetimeFigureOut">
               <a:rPr lang="en-US" smtClean="0"/>
-              <a:t>11/8/23</a:t>
+              <a:t>8/15/25</a:t>
             </a:fld>
             <a:endParaRPr lang="en-US"/>
           </a:p>
@@ -2812,7 +2812,7 @@
           <a:p>
             <a:fld id="{19A37E14-C902-8243-905A-238D1EC85CD8}" type="datetimeFigureOut">
               <a:rPr lang="en-US" smtClean="0"/>
-              <a:t>11/8/23</a:t>
+              <a:t>8/15/25</a:t>
             </a:fld>
             <a:endParaRPr lang="en-US"/>
           </a:p>
@@ -3224,7 +3224,7 @@
           <a:p>
             <a:fld id="{19A37E14-C902-8243-905A-238D1EC85CD8}" type="datetimeFigureOut">
               <a:rPr lang="en-US" smtClean="0"/>
-              <a:t>11/8/23</a:t>
+              <a:t>8/15/25</a:t>
             </a:fld>
             <a:endParaRPr lang="en-US"/>
           </a:p>
@@ -3365,7 +3365,7 @@
           <a:p>
             <a:fld id="{19A37E14-C902-8243-905A-238D1EC85CD8}" type="datetimeFigureOut">
               <a:rPr lang="en-US" smtClean="0"/>
-              <a:t>11/8/23</a:t>
+              <a:t>8/15/25</a:t>
             </a:fld>
             <a:endParaRPr lang="en-US"/>
           </a:p>
@@ -3478,7 +3478,7 @@
           <a:p>
             <a:fld id="{19A37E14-C902-8243-905A-238D1EC85CD8}" type="datetimeFigureOut">
               <a:rPr lang="en-US" smtClean="0"/>
-              <a:t>11/8/23</a:t>
+              <a:t>8/15/25</a:t>
             </a:fld>
             <a:endParaRPr lang="en-US"/>
           </a:p>
@@ -3789,7 +3789,7 @@
           <a:p>
             <a:fld id="{19A37E14-C902-8243-905A-238D1EC85CD8}" type="datetimeFigureOut">
               <a:rPr lang="en-US" smtClean="0"/>
-              <a:t>11/8/23</a:t>
+              <a:t>8/15/25</a:t>
             </a:fld>
             <a:endParaRPr lang="en-US"/>
           </a:p>
@@ -4077,7 +4077,7 @@
           <a:p>
             <a:fld id="{19A37E14-C902-8243-905A-238D1EC85CD8}" type="datetimeFigureOut">
               <a:rPr lang="en-US" smtClean="0"/>
-              <a:t>11/8/23</a:t>
+              <a:t>8/15/25</a:t>
             </a:fld>
             <a:endParaRPr lang="en-US"/>
           </a:p>
@@ -4318,7 +4318,7 @@
           <a:p>
             <a:fld id="{19A37E14-C902-8243-905A-238D1EC85CD8}" type="datetimeFigureOut">
               <a:rPr lang="en-US" smtClean="0"/>
-              <a:t>11/8/23</a:t>
+              <a:t>8/15/25</a:t>
             </a:fld>
             <a:endParaRPr lang="en-US"/>
           </a:p>

</xml_diff>

<commit_message>
Move lecture 13-15 notes to docs/slides/
</commit_message>
<xml_diff>
--- a/docs/slides/11-PrivacyLaw.pptx
+++ b/docs/slides/11-PrivacyLaw.pptx
@@ -238,7 +238,7 @@
           <a:p>
             <a:fld id="{8F056EA2-8B1B-C340-B660-BC2CADC569EB}" type="datetimeFigureOut">
               <a:rPr lang="en-US" smtClean="0"/>
-              <a:t>8/15/25</a:t>
+              <a:t>11/12/25</a:t>
             </a:fld>
             <a:endParaRPr lang="en-US"/>
           </a:p>
@@ -589,6 +589,804 @@
 </p:notes>
 </file>
 
+<file path=ppt/notesSlides/notesSlide10.xml><?xml version="1.0" encoding="utf-8"?>
+<p:notes xmlns:a="http://schemas.openxmlformats.org/drawingml/2006/main" xmlns:r="http://schemas.openxmlformats.org/officeDocument/2006/relationships" xmlns:p="http://schemas.openxmlformats.org/presentationml/2006/main">
+  <p:cSld>
+    <p:spTree>
+      <p:nvGrpSpPr>
+        <p:cNvPr id="1" name=""/>
+        <p:cNvGrpSpPr/>
+        <p:nvPr/>
+      </p:nvGrpSpPr>
+      <p:grpSpPr>
+        <a:xfrm>
+          <a:off x="0" y="0"/>
+          <a:ext cx="0" cy="0"/>
+          <a:chOff x="0" y="0"/>
+          <a:chExt cx="0" cy="0"/>
+        </a:xfrm>
+      </p:grpSpPr>
+      <p:sp>
+        <p:nvSpPr>
+          <p:cNvPr id="2" name="Slide Image Placeholder 1"/>
+          <p:cNvSpPr>
+            <a:spLocks noGrp="1" noRot="1" noChangeAspect="1"/>
+          </p:cNvSpPr>
+          <p:nvPr>
+            <p:ph type="sldImg" idx="2"/>
+          </p:nvPr>
+        </p:nvSpPr>
+        <p:spPr/>
+      </p:sp>
+      <p:sp>
+        <p:nvSpPr>
+          <p:cNvPr id="3" name="Notes Placeholder 2"/>
+          <p:cNvSpPr>
+            <a:spLocks noGrp="1"/>
+          </p:cNvSpPr>
+          <p:nvPr>
+            <p:ph type="body" sz="quarter" idx="3"/>
+          </p:nvPr>
+        </p:nvSpPr>
+        <p:spPr/>
+        <p:txBody>
+          <a:bodyPr/>
+          <a:lstStyle/>
+          <a:p>
+            <a:r>
+              <a:t>What to say: "Security enables privacy. No point in privacy laws if data gets breached. This led to breach notification laws." </a:t>
+            </a:r>
+          </a:p>
+        </p:txBody>
+      </p:sp>
+      <p:sp>
+        <p:nvSpPr>
+          <p:cNvPr id="4" name="Slide Number Placeholder 3"/>
+          <p:cNvSpPr>
+            <a:spLocks noGrp="1"/>
+          </p:cNvSpPr>
+          <p:nvPr>
+            <p:ph type="sldNum" sz="quarter" idx="5"/>
+          </p:nvPr>
+        </p:nvSpPr>
+        <p:spPr/>
+      </p:sp>
+    </p:spTree>
+  </p:cSld>
+  <p:clrMapOvr>
+    <a:masterClrMapping/>
+  </p:clrMapOvr>
+</p:notes>
+</file>
+
+<file path=ppt/notesSlides/notesSlide11.xml><?xml version="1.0" encoding="utf-8"?>
+<p:notes xmlns:a="http://schemas.openxmlformats.org/drawingml/2006/main" xmlns:r="http://schemas.openxmlformats.org/officeDocument/2006/relationships" xmlns:p="http://schemas.openxmlformats.org/presentationml/2006/main">
+  <p:cSld>
+    <p:spTree>
+      <p:nvGrpSpPr>
+        <p:cNvPr id="1" name=""/>
+        <p:cNvGrpSpPr/>
+        <p:nvPr/>
+      </p:nvGrpSpPr>
+      <p:grpSpPr>
+        <a:xfrm>
+          <a:off x="0" y="0"/>
+          <a:ext cx="0" cy="0"/>
+          <a:chOff x="0" y="0"/>
+          <a:chExt cx="0" cy="0"/>
+        </a:xfrm>
+      </p:grpSpPr>
+      <p:sp>
+        <p:nvSpPr>
+          <p:cNvPr id="2" name="Slide Image Placeholder 1"/>
+          <p:cNvSpPr>
+            <a:spLocks noGrp="1" noRot="1" noChangeAspect="1"/>
+          </p:cNvSpPr>
+          <p:nvPr>
+            <p:ph type="sldImg" idx="2"/>
+          </p:nvPr>
+        </p:nvSpPr>
+        <p:spPr/>
+      </p:sp>
+      <p:sp>
+        <p:nvSpPr>
+          <p:cNvPr id="3" name="Notes Placeholder 2"/>
+          <p:cNvSpPr>
+            <a:spLocks noGrp="1"/>
+          </p:cNvSpPr>
+          <p:nvPr>
+            <p:ph type="body" sz="quarter" idx="3"/>
+          </p:nvPr>
+        </p:nvSpPr>
+        <p:spPr/>
+        <p:txBody>
+          <a:bodyPr/>
+          <a:lstStyle/>
+          <a:p>
+            <a:r>
+              <a:t>What to say: "Modern additions: minimization (collect only what you need), breach notification, accountability. These evolved as weaknesses in original FIPPs became clear." </a:t>
+            </a:r>
+          </a:p>
+        </p:txBody>
+      </p:sp>
+      <p:sp>
+        <p:nvSpPr>
+          <p:cNvPr id="4" name="Slide Number Placeholder 3"/>
+          <p:cNvSpPr>
+            <a:spLocks noGrp="1"/>
+          </p:cNvSpPr>
+          <p:nvPr>
+            <p:ph type="sldNum" sz="quarter" idx="5"/>
+          </p:nvPr>
+        </p:nvSpPr>
+        <p:spPr/>
+      </p:sp>
+    </p:spTree>
+  </p:cSld>
+  <p:clrMapOvr>
+    <a:masterClrMapping/>
+  </p:clrMapOvr>
+</p:notes>
+</file>
+
+<file path=ppt/notesSlides/notesSlide12.xml><?xml version="1.0" encoding="utf-8"?>
+<p:notes xmlns:a="http://schemas.openxmlformats.org/drawingml/2006/main" xmlns:r="http://schemas.openxmlformats.org/officeDocument/2006/relationships" xmlns:p="http://schemas.openxmlformats.org/presentationml/2006/main">
+  <p:cSld>
+    <p:spTree>
+      <p:nvGrpSpPr>
+        <p:cNvPr id="1" name=""/>
+        <p:cNvGrpSpPr/>
+        <p:nvPr/>
+      </p:nvGrpSpPr>
+      <p:grpSpPr>
+        <a:xfrm>
+          <a:off x="0" y="0"/>
+          <a:ext cx="0" cy="0"/>
+          <a:chOff x="0" y="0"/>
+          <a:chExt cx="0" cy="0"/>
+        </a:xfrm>
+      </p:grpSpPr>
+      <p:sp>
+        <p:nvSpPr>
+          <p:cNvPr id="2" name="Slide Image Placeholder 1"/>
+          <p:cNvSpPr>
+            <a:spLocks noGrp="1" noRot="1" noChangeAspect="1"/>
+          </p:cNvSpPr>
+          <p:nvPr>
+            <p:ph type="sldImg" idx="2"/>
+          </p:nvPr>
+        </p:nvSpPr>
+        <p:spPr/>
+      </p:sp>
+      <p:sp>
+        <p:nvSpPr>
+          <p:cNvPr id="3" name="Notes Placeholder 2"/>
+          <p:cNvSpPr>
+            <a:spLocks noGrp="1"/>
+          </p:cNvSpPr>
+          <p:nvPr>
+            <p:ph type="body" sz="quarter" idx="3"/>
+          </p:nvPr>
+        </p:nvSpPr>
+        <p:spPr/>
+        <p:txBody>
+          <a:bodyPr/>
+          <a:lstStyle/>
+          <a:p>
+            <a:r>
+              <a:t>What to say: "Are FIPPs outdated? Example: differential privacy deliberately adds noise to data. That violates 'data must be correct' but enhances privacy. The paradigm may need updating for modern ML/AI." </a:t>
+            </a:r>
+          </a:p>
+        </p:txBody>
+      </p:sp>
+      <p:sp>
+        <p:nvSpPr>
+          <p:cNvPr id="4" name="Slide Number Placeholder 3"/>
+          <p:cNvSpPr>
+            <a:spLocks noGrp="1"/>
+          </p:cNvSpPr>
+          <p:nvPr>
+            <p:ph type="sldNum" sz="quarter" idx="5"/>
+          </p:nvPr>
+        </p:nvSpPr>
+        <p:spPr/>
+      </p:sp>
+    </p:spTree>
+  </p:cSld>
+  <p:clrMapOvr>
+    <a:masterClrMapping/>
+  </p:clrMapOvr>
+</p:notes>
+</file>
+
+<file path=ppt/notesSlides/notesSlide13.xml><?xml version="1.0" encoding="utf-8"?>
+<p:notes xmlns:a="http://schemas.openxmlformats.org/drawingml/2006/main" xmlns:r="http://schemas.openxmlformats.org/officeDocument/2006/relationships" xmlns:p="http://schemas.openxmlformats.org/presentationml/2006/main">
+  <p:cSld>
+    <p:spTree>
+      <p:nvGrpSpPr>
+        <p:cNvPr id="1" name=""/>
+        <p:cNvGrpSpPr/>
+        <p:nvPr/>
+      </p:nvGrpSpPr>
+      <p:grpSpPr>
+        <a:xfrm>
+          <a:off x="0" y="0"/>
+          <a:ext cx="0" cy="0"/>
+          <a:chOff x="0" y="0"/>
+          <a:chExt cx="0" cy="0"/>
+        </a:xfrm>
+      </p:grpSpPr>
+      <p:sp>
+        <p:nvSpPr>
+          <p:cNvPr id="2" name="Slide Image Placeholder 1"/>
+          <p:cNvSpPr>
+            <a:spLocks noGrp="1" noRot="1" noChangeAspect="1"/>
+          </p:cNvSpPr>
+          <p:nvPr>
+            <p:ph type="sldImg"/>
+          </p:nvPr>
+        </p:nvSpPr>
+        <p:spPr/>
+      </p:sp>
+      <p:sp>
+        <p:nvSpPr>
+          <p:cNvPr id="3" name="Notes Placeholder 2"/>
+          <p:cNvSpPr>
+            <a:spLocks noGrp="1"/>
+          </p:cNvSpPr>
+          <p:nvPr>
+            <p:ph type="body" idx="1"/>
+          </p:nvPr>
+        </p:nvSpPr>
+        <p:spPr/>
+        <p:txBody>
+          <a:bodyPr/>
+          <a:lstStyle/>
+          <a:p>
+            <a:r>
+              <a:t>What to say: "Old model: data is static, stored in databases. New model: data is queried, inferred from, probabilistically analyzed. FIPPs weren't designed for this." </a:t>
+            </a:r>
+          </a:p>
+        </p:txBody>
+      </p:sp>
+      <p:sp>
+        <p:nvSpPr>
+          <p:cNvPr id="4" name="Slide Number Placeholder 3"/>
+          <p:cNvSpPr>
+            <a:spLocks noGrp="1"/>
+          </p:cNvSpPr>
+          <p:nvPr>
+            <p:ph type="sldNum" sz="quarter" idx="10"/>
+          </p:nvPr>
+        </p:nvSpPr>
+        <p:spPr/>
+        <p:txBody>
+          <a:bodyPr/>
+          <a:lstStyle/>
+          <a:p>
+            <a:fld id="{60EA165A-C3FE-834A-926F-47D8C9BA346E}" type="slidenum">
+              <a:rPr lang="en-US" smtClean="0"/>
+              <a:t>15</a:t>
+            </a:fld>
+            <a:endParaRPr lang="en-US"/>
+          </a:p>
+        </p:txBody>
+      </p:sp>
+    </p:spTree>
+    <p:extLst>
+      <p:ext uri="{BB962C8B-B14F-4D97-AF65-F5344CB8AC3E}">
+        <p14:creationId xmlns:p14="http://schemas.microsoft.com/office/powerpoint/2010/main" val="309170325"/>
+      </p:ext>
+    </p:extLst>
+  </p:cSld>
+  <p:clrMapOvr>
+    <a:masterClrMapping/>
+  </p:clrMapOvr>
+</p:notes>
+</file>
+
+<file path=ppt/notesSlides/notesSlide14.xml><?xml version="1.0" encoding="utf-8"?>
+<p:notes xmlns:a="http://schemas.openxmlformats.org/drawingml/2006/main" xmlns:r="http://schemas.openxmlformats.org/officeDocument/2006/relationships" xmlns:p="http://schemas.openxmlformats.org/presentationml/2006/main">
+  <p:cSld>
+    <p:spTree>
+      <p:nvGrpSpPr>
+        <p:cNvPr id="1" name=""/>
+        <p:cNvGrpSpPr/>
+        <p:nvPr/>
+      </p:nvGrpSpPr>
+      <p:grpSpPr>
+        <a:xfrm>
+          <a:off x="0" y="0"/>
+          <a:ext cx="0" cy="0"/>
+          <a:chOff x="0" y="0"/>
+          <a:chExt cx="0" cy="0"/>
+        </a:xfrm>
+      </p:grpSpPr>
+      <p:sp>
+        <p:nvSpPr>
+          <p:cNvPr id="2" name="Slide Image Placeholder 1"/>
+          <p:cNvSpPr>
+            <a:spLocks noGrp="1" noRot="1" noChangeAspect="1"/>
+          </p:cNvSpPr>
+          <p:nvPr>
+            <p:ph type="sldImg"/>
+          </p:nvPr>
+        </p:nvSpPr>
+        <p:spPr/>
+      </p:sp>
+      <p:sp>
+        <p:nvSpPr>
+          <p:cNvPr id="3" name="Notes Placeholder 2"/>
+          <p:cNvSpPr>
+            <a:spLocks noGrp="1"/>
+          </p:cNvSpPr>
+          <p:nvPr>
+            <p:ph type="body" idx="1"/>
+          </p:nvPr>
+        </p:nvSpPr>
+        <p:spPr/>
+        <p:txBody>
+          <a:bodyPr/>
+          <a:lstStyle/>
+          <a:p>
+            <a:r>
+              <a:t>What to say: "PII concept is also outdated. Remove name, SSN, address = safe? Wrong. Netflix 'anonymized' data was re-identified. AOL search data was re-identified. PII is not a bright line."</a:t>
+            </a:r>
+          </a:p>
+          <a:p>
+            <a:r>
+              <a:t>Famous case: Netflix Prize dataset re-identification (2006)</a:t>
+            </a:r>
+          </a:p>
+        </p:txBody>
+      </p:sp>
+      <p:sp>
+        <p:nvSpPr>
+          <p:cNvPr id="4" name="Slide Number Placeholder 3"/>
+          <p:cNvSpPr>
+            <a:spLocks noGrp="1"/>
+          </p:cNvSpPr>
+          <p:nvPr>
+            <p:ph type="sldNum" sz="quarter" idx="10"/>
+          </p:nvPr>
+        </p:nvSpPr>
+        <p:spPr/>
+        <p:txBody>
+          <a:bodyPr/>
+          <a:lstStyle/>
+          <a:p>
+            <a:fld id="{60EA165A-C3FE-834A-926F-47D8C9BA346E}" type="slidenum">
+              <a:rPr lang="en-US" smtClean="0"/>
+              <a:t>16</a:t>
+            </a:fld>
+            <a:endParaRPr lang="en-US"/>
+          </a:p>
+        </p:txBody>
+      </p:sp>
+    </p:spTree>
+    <p:extLst>
+      <p:ext uri="{BB962C8B-B14F-4D97-AF65-F5344CB8AC3E}">
+        <p14:creationId xmlns:p14="http://schemas.microsoft.com/office/powerpoint/2010/main" val="1470667941"/>
+      </p:ext>
+    </p:extLst>
+  </p:cSld>
+  <p:clrMapOvr>
+    <a:masterClrMapping/>
+  </p:clrMapOvr>
+</p:notes>
+</file>
+
+<file path=ppt/notesSlides/notesSlide15.xml><?xml version="1.0" encoding="utf-8"?>
+<p:notes xmlns:a="http://schemas.openxmlformats.org/drawingml/2006/main" xmlns:r="http://schemas.openxmlformats.org/officeDocument/2006/relationships" xmlns:p="http://schemas.openxmlformats.org/presentationml/2006/main">
+  <p:cSld>
+    <p:spTree>
+      <p:nvGrpSpPr>
+        <p:cNvPr id="1" name=""/>
+        <p:cNvGrpSpPr/>
+        <p:nvPr/>
+      </p:nvGrpSpPr>
+      <p:grpSpPr>
+        <a:xfrm>
+          <a:off x="0" y="0"/>
+          <a:ext cx="0" cy="0"/>
+          <a:chOff x="0" y="0"/>
+          <a:chExt cx="0" cy="0"/>
+        </a:xfrm>
+      </p:grpSpPr>
+      <p:sp>
+        <p:nvSpPr>
+          <p:cNvPr id="2" name="Slide Image Placeholder 1"/>
+          <p:cNvSpPr>
+            <a:spLocks noGrp="1" noRot="1" noChangeAspect="1"/>
+          </p:cNvSpPr>
+          <p:nvPr>
+            <p:ph type="sldImg" idx="2"/>
+          </p:nvPr>
+        </p:nvSpPr>
+        <p:spPr/>
+      </p:sp>
+      <p:sp>
+        <p:nvSpPr>
+          <p:cNvPr id="3" name="Notes Placeholder 2"/>
+          <p:cNvSpPr>
+            <a:spLocks noGrp="1"/>
+          </p:cNvSpPr>
+          <p:nvPr>
+            <p:ph type="body" sz="quarter" idx="3"/>
+          </p:nvPr>
+        </p:nvSpPr>
+        <p:spPr/>
+        <p:txBody>
+          <a:bodyPr/>
+          <a:lstStyle/>
+          <a:p>
+            <a:r>
+              <a:t>What to say: "FIPPs assume data sits in databases and gets retrieved. But modern ML does inference, prediction, pattern matching. Different threat model." </a:t>
+            </a:r>
+          </a:p>
+        </p:txBody>
+      </p:sp>
+      <p:sp>
+        <p:nvSpPr>
+          <p:cNvPr id="4" name="Slide Number Placeholder 3"/>
+          <p:cNvSpPr>
+            <a:spLocks noGrp="1"/>
+          </p:cNvSpPr>
+          <p:nvPr>
+            <p:ph type="sldNum" sz="quarter" idx="5"/>
+          </p:nvPr>
+        </p:nvSpPr>
+        <p:spPr/>
+      </p:sp>
+    </p:spTree>
+  </p:cSld>
+  <p:clrMapOvr>
+    <a:masterClrMapping/>
+  </p:clrMapOvr>
+</p:notes>
+</file>
+
+<file path=ppt/notesSlides/notesSlide16.xml><?xml version="1.0" encoding="utf-8"?>
+<p:notes xmlns:a="http://schemas.openxmlformats.org/drawingml/2006/main" xmlns:r="http://schemas.openxmlformats.org/officeDocument/2006/relationships" xmlns:p="http://schemas.openxmlformats.org/presentationml/2006/main">
+  <p:cSld>
+    <p:spTree>
+      <p:nvGrpSpPr>
+        <p:cNvPr id="1" name=""/>
+        <p:cNvGrpSpPr/>
+        <p:nvPr/>
+      </p:nvGrpSpPr>
+      <p:grpSpPr>
+        <a:xfrm>
+          <a:off x="0" y="0"/>
+          <a:ext cx="0" cy="0"/>
+          <a:chOff x="0" y="0"/>
+          <a:chExt cx="0" cy="0"/>
+        </a:xfrm>
+      </p:grpSpPr>
+      <p:sp>
+        <p:nvSpPr>
+          <p:cNvPr id="2" name="Slide Image Placeholder 1"/>
+          <p:cNvSpPr>
+            <a:spLocks noGrp="1" noRot="1" noChangeAspect="1"/>
+          </p:cNvSpPr>
+          <p:nvPr>
+            <p:ph type="sldImg"/>
+          </p:nvPr>
+        </p:nvSpPr>
+        <p:spPr/>
+      </p:sp>
+      <p:sp>
+        <p:nvSpPr>
+          <p:cNvPr id="3" name="Notes Placeholder 2"/>
+          <p:cNvSpPr>
+            <a:spLocks noGrp="1"/>
+          </p:cNvSpPr>
+          <p:nvPr>
+            <p:ph type="body" idx="1"/>
+          </p:nvPr>
+        </p:nvSpPr>
+        <p:spPr/>
+        <p:txBody>
+          <a:bodyPr/>
+          <a:lstStyle/>
+          <a:p>
+            <a:r>
+              <a:t>What to say: "Modern laws like California's CCPA try to fix the PII problem with 'de-identification' standards. But it's hard to define 'reasonably linked.'" </a:t>
+            </a:r>
+          </a:p>
+        </p:txBody>
+      </p:sp>
+      <p:sp>
+        <p:nvSpPr>
+          <p:cNvPr id="4" name="Slide Number Placeholder 3"/>
+          <p:cNvSpPr>
+            <a:spLocks noGrp="1"/>
+          </p:cNvSpPr>
+          <p:nvPr>
+            <p:ph type="sldNum" sz="quarter" idx="5"/>
+          </p:nvPr>
+        </p:nvSpPr>
+        <p:spPr/>
+        <p:txBody>
+          <a:bodyPr/>
+          <a:lstStyle/>
+          <a:p>
+            <a:fld id="{19237381-9D2A-0D46-A31D-B9FCFAE45650}" type="slidenum">
+              <a:rPr lang="en-US" smtClean="0"/>
+              <a:t>20</a:t>
+            </a:fld>
+            <a:endParaRPr lang="en-US"/>
+          </a:p>
+        </p:txBody>
+      </p:sp>
+    </p:spTree>
+    <p:extLst>
+      <p:ext uri="{BB962C8B-B14F-4D97-AF65-F5344CB8AC3E}">
+        <p14:creationId xmlns:p14="http://schemas.microsoft.com/office/powerpoint/2010/main" val="3598152422"/>
+      </p:ext>
+    </p:extLst>
+  </p:cSld>
+  <p:clrMapOvr>
+    <a:masterClrMapping/>
+  </p:clrMapOvr>
+</p:notes>
+</file>
+
+<file path=ppt/notesSlides/notesSlide17.xml><?xml version="1.0" encoding="utf-8"?>
+<p:notes xmlns:a="http://schemas.openxmlformats.org/drawingml/2006/main" xmlns:r="http://schemas.openxmlformats.org/officeDocument/2006/relationships" xmlns:p="http://schemas.openxmlformats.org/presentationml/2006/main">
+  <p:cSld>
+    <p:spTree>
+      <p:nvGrpSpPr>
+        <p:cNvPr id="1" name=""/>
+        <p:cNvGrpSpPr/>
+        <p:nvPr/>
+      </p:nvGrpSpPr>
+      <p:grpSpPr>
+        <a:xfrm>
+          <a:off x="0" y="0"/>
+          <a:ext cx="0" cy="0"/>
+          <a:chOff x="0" y="0"/>
+          <a:chExt cx="0" cy="0"/>
+        </a:xfrm>
+      </p:grpSpPr>
+      <p:sp>
+        <p:nvSpPr>
+          <p:cNvPr id="2" name="Slide Image Placeholder 1"/>
+          <p:cNvSpPr>
+            <a:spLocks noGrp="1" noRot="1" noChangeAspect="1"/>
+          </p:cNvSpPr>
+          <p:nvPr>
+            <p:ph type="sldImg" idx="2"/>
+          </p:nvPr>
+        </p:nvSpPr>
+        <p:spPr/>
+      </p:sp>
+      <p:sp>
+        <p:nvSpPr>
+          <p:cNvPr id="3" name="Notes Placeholder 2"/>
+          <p:cNvSpPr>
+            <a:spLocks noGrp="1"/>
+          </p:cNvSpPr>
+          <p:nvPr>
+            <p:ph type="body" sz="quarter" idx="3"/>
+          </p:nvPr>
+        </p:nvSpPr>
+        <p:spPr/>
+        <p:txBody>
+          <a:bodyPr/>
+          <a:lstStyle/>
+          <a:p>
+            <a:r>
+              <a:t>What to say: "US privacy law is a patchwork based on: (1) who has the data, (2) what harm might occur, (3) what transaction is happening. No comprehensive federal law." </a:t>
+            </a:r>
+          </a:p>
+        </p:txBody>
+      </p:sp>
+      <p:sp>
+        <p:nvSpPr>
+          <p:cNvPr id="4" name="Slide Number Placeholder 3"/>
+          <p:cNvSpPr>
+            <a:spLocks noGrp="1"/>
+          </p:cNvSpPr>
+          <p:nvPr>
+            <p:ph type="sldNum" sz="quarter" idx="5"/>
+          </p:nvPr>
+        </p:nvSpPr>
+        <p:spPr/>
+      </p:sp>
+    </p:spTree>
+  </p:cSld>
+  <p:clrMapOvr>
+    <a:masterClrMapping/>
+  </p:clrMapOvr>
+</p:notes>
+</file>
+
+<file path=ppt/notesSlides/notesSlide18.xml><?xml version="1.0" encoding="utf-8"?>
+<p:notes xmlns:a="http://schemas.openxmlformats.org/drawingml/2006/main" xmlns:r="http://schemas.openxmlformats.org/officeDocument/2006/relationships" xmlns:p="http://schemas.openxmlformats.org/presentationml/2006/main">
+  <p:cSld>
+    <p:spTree>
+      <p:nvGrpSpPr>
+        <p:cNvPr id="1" name=""/>
+        <p:cNvGrpSpPr/>
+        <p:nvPr/>
+      </p:nvGrpSpPr>
+      <p:grpSpPr>
+        <a:xfrm>
+          <a:off x="0" y="0"/>
+          <a:ext cx="0" cy="0"/>
+          <a:chOff x="0" y="0"/>
+          <a:chExt cx="0" cy="0"/>
+        </a:xfrm>
+      </p:grpSpPr>
+      <p:sp>
+        <p:nvSpPr>
+          <p:cNvPr id="2" name="Slide Image Placeholder 1"/>
+          <p:cNvSpPr>
+            <a:spLocks noGrp="1" noRot="1" noChangeAspect="1"/>
+          </p:cNvSpPr>
+          <p:nvPr>
+            <p:ph type="sldImg" idx="2"/>
+          </p:nvPr>
+        </p:nvSpPr>
+        <p:spPr/>
+      </p:sp>
+      <p:sp>
+        <p:nvSpPr>
+          <p:cNvPr id="3" name="Notes Placeholder 2"/>
+          <p:cNvSpPr>
+            <a:spLocks noGrp="1"/>
+          </p:cNvSpPr>
+          <p:nvPr>
+            <p:ph type="body" sz="quarter" idx="3"/>
+          </p:nvPr>
+        </p:nvSpPr>
+        <p:spPr/>
+        <p:txBody>
+          <a:bodyPr/>
+          <a:lstStyle/>
+          <a:p>
+            <a:r>
+              <a:t>What to say:</a:t>
+            </a:r>
+          </a:p>
+          <a:p>
+            <a:r>
+              <a:t>- Privacy Act (1974): Post-Watergate, only applies to federal agencies</a:t>
+            </a:r>
+          </a:p>
+          <a:p>
+            <a:r>
+              <a:t>- FCRA (1970): Credit bureaus only</a:t>
+            </a:r>
+          </a:p>
+          <a:p>
+            <a:r>
+              <a:t>- FERPA (1974): Schools collected data on kids' home lives - Congress freaked out</a:t>
+            </a:r>
+          </a:p>
+          <a:p>
+            <a:r>
+              <a:t>- Video Privacy Protection Act (1988): Reporter published Judge Bork's video rental history during Supreme Court nomination. Congress passed law within months.</a:t>
+            </a:r>
+          </a:p>
+          <a:p>
+            <a:r>
+              <a:t>- Driver's Privacy Protection Act (1994): States were selling DMV data</a:t>
+            </a:r>
+          </a:p>
+        </p:txBody>
+      </p:sp>
+      <p:sp>
+        <p:nvSpPr>
+          <p:cNvPr id="4" name="Slide Number Placeholder 3"/>
+          <p:cNvSpPr>
+            <a:spLocks noGrp="1"/>
+          </p:cNvSpPr>
+          <p:nvPr>
+            <p:ph type="sldNum" sz="quarter" idx="5"/>
+          </p:nvPr>
+        </p:nvSpPr>
+        <p:spPr/>
+      </p:sp>
+    </p:spTree>
+  </p:cSld>
+  <p:clrMapOvr>
+    <a:masterClrMapping/>
+  </p:clrMapOvr>
+</p:notes>
+</file>
+
+<file path=ppt/notesSlides/notesSlide19.xml><?xml version="1.0" encoding="utf-8"?>
+<p:notes xmlns:a="http://schemas.openxmlformats.org/drawingml/2006/main" xmlns:r="http://schemas.openxmlformats.org/officeDocument/2006/relationships" xmlns:p="http://schemas.openxmlformats.org/presentationml/2006/main">
+  <p:cSld>
+    <p:spTree>
+      <p:nvGrpSpPr>
+        <p:cNvPr id="1" name=""/>
+        <p:cNvGrpSpPr/>
+        <p:nvPr/>
+      </p:nvGrpSpPr>
+      <p:grpSpPr>
+        <a:xfrm>
+          <a:off x="0" y="0"/>
+          <a:ext cx="0" cy="0"/>
+          <a:chOff x="0" y="0"/>
+          <a:chExt cx="0" cy="0"/>
+        </a:xfrm>
+      </p:grpSpPr>
+      <p:sp>
+        <p:nvSpPr>
+          <p:cNvPr id="2" name="Slide Image Placeholder 1"/>
+          <p:cNvSpPr>
+            <a:spLocks noGrp="1" noRot="1" noChangeAspect="1"/>
+          </p:cNvSpPr>
+          <p:nvPr>
+            <p:ph type="sldImg" idx="2"/>
+          </p:nvPr>
+        </p:nvSpPr>
+        <p:spPr/>
+      </p:sp>
+      <p:sp>
+        <p:nvSpPr>
+          <p:cNvPr id="3" name="Notes Placeholder 2"/>
+          <p:cNvSpPr>
+            <a:spLocks noGrp="1"/>
+          </p:cNvSpPr>
+          <p:nvPr>
+            <p:ph type="body" sz="quarter" idx="3"/>
+          </p:nvPr>
+        </p:nvSpPr>
+        <p:spPr/>
+        <p:txBody>
+          <a:bodyPr/>
+          <a:lstStyle/>
+          <a:p>
+            <a:r>
+              <a:t>What to say:</a:t>
+            </a:r>
+          </a:p>
+          <a:p>
+            <a:r>
+              <a:t>- HIPAA (1996): Covers healthcare providers/insurers but NOT fitness apps, 23andMe, etc.</a:t>
+            </a:r>
+          </a:p>
+          <a:p>
+            <a:r>
+              <a:t>- GLBA (1999): Banks can share data among affiliates</a:t>
+            </a:r>
+          </a:p>
+          <a:p>
+            <a:r>
+              <a:t>- COPPA (1998): Kids under 13 need parental consent</a:t>
+            </a:r>
+          </a:p>
+          <a:p>
+            <a:r>
+              <a:t>- GINA (2008): Can't discriminate based on genetic information</a:t>
+            </a:r>
+          </a:p>
+        </p:txBody>
+      </p:sp>
+      <p:sp>
+        <p:nvSpPr>
+          <p:cNvPr id="4" name="Slide Number Placeholder 3"/>
+          <p:cNvSpPr>
+            <a:spLocks noGrp="1"/>
+          </p:cNvSpPr>
+          <p:nvPr>
+            <p:ph type="sldNum" sz="quarter" idx="5"/>
+          </p:nvPr>
+        </p:nvSpPr>
+        <p:spPr/>
+      </p:sp>
+    </p:spTree>
+  </p:cSld>
+  <p:clrMapOvr>
+    <a:masterClrMapping/>
+  </p:clrMapOvr>
+</p:notes>
+</file>
+
 <file path=ppt/notesSlides/notesSlide2.xml><?xml version="1.0" encoding="utf-8"?>
 <p:notes xmlns:a="http://schemas.openxmlformats.org/drawingml/2006/main" xmlns:r="http://schemas.openxmlformats.org/officeDocument/2006/relationships" xmlns:p="http://schemas.openxmlformats.org/presentationml/2006/main">
   <p:cSld>
@@ -613,6 +1411,596 @@
             <a:spLocks noGrp="1" noRot="1" noChangeAspect="1"/>
           </p:cNvSpPr>
           <p:nvPr>
+            <p:ph type="sldImg" idx="2"/>
+          </p:nvPr>
+        </p:nvSpPr>
+        <p:spPr/>
+      </p:sp>
+      <p:sp>
+        <p:nvSpPr>
+          <p:cNvPr id="3" name="Notes Placeholder 2"/>
+          <p:cNvSpPr>
+            <a:spLocks noGrp="1"/>
+          </p:cNvSpPr>
+          <p:nvPr>
+            <p:ph type="body" sz="quarter" idx="3"/>
+          </p:nvPr>
+        </p:nvSpPr>
+        <p:spPr/>
+        <p:txBody>
+          <a:bodyPr/>
+          <a:lstStyle/>
+          <a:p>
+            <a:r>
+              <a:t>Context: This is the 1890 Harvard Law Review article "The Right to Privacy"</a:t>
+            </a:r>
+          </a:p>
+          <a:p>
+            <a:r>
+              <a:t>What to say: "This article was written in response to new photography technology and gossip journalism. Warren was upset about newspapers covering his family's social events. Sound familiar? Privacy law always responds to new technology."</a:t>
+            </a:r>
+          </a:p>
+          <a:p>
+            <a:r>
+              <a:t>URL: https://www.cs.cornell.edu/~shmat/courses/cs5436/warren-brandeis.pdf</a:t>
+            </a:r>
+          </a:p>
+        </p:txBody>
+      </p:sp>
+      <p:sp>
+        <p:nvSpPr>
+          <p:cNvPr id="4" name="Slide Number Placeholder 3"/>
+          <p:cNvSpPr>
+            <a:spLocks noGrp="1"/>
+          </p:cNvSpPr>
+          <p:nvPr>
+            <p:ph type="sldNum" sz="quarter" idx="5"/>
+          </p:nvPr>
+        </p:nvSpPr>
+        <p:spPr/>
+      </p:sp>
+    </p:spTree>
+  </p:cSld>
+  <p:clrMapOvr>
+    <a:masterClrMapping/>
+  </p:clrMapOvr>
+</p:notes>
+</file>
+
+<file path=ppt/notesSlides/notesSlide20.xml><?xml version="1.0" encoding="utf-8"?>
+<p:notes xmlns:a="http://schemas.openxmlformats.org/drawingml/2006/main" xmlns:r="http://schemas.openxmlformats.org/officeDocument/2006/relationships" xmlns:p="http://schemas.openxmlformats.org/presentationml/2006/main">
+  <p:cSld>
+    <p:spTree>
+      <p:nvGrpSpPr>
+        <p:cNvPr id="1" name=""/>
+        <p:cNvGrpSpPr/>
+        <p:nvPr/>
+      </p:nvGrpSpPr>
+      <p:grpSpPr>
+        <a:xfrm>
+          <a:off x="0" y="0"/>
+          <a:ext cx="0" cy="0"/>
+          <a:chOff x="0" y="0"/>
+          <a:chExt cx="0" cy="0"/>
+        </a:xfrm>
+      </p:grpSpPr>
+      <p:sp>
+        <p:nvSpPr>
+          <p:cNvPr id="2" name="Slide Image Placeholder 1"/>
+          <p:cNvSpPr>
+            <a:spLocks noGrp="1" noRot="1" noChangeAspect="1"/>
+          </p:cNvSpPr>
+          <p:nvPr>
+            <p:ph type="sldImg" idx="2"/>
+          </p:nvPr>
+        </p:nvSpPr>
+        <p:spPr/>
+      </p:sp>
+      <p:sp>
+        <p:nvSpPr>
+          <p:cNvPr id="3" name="Notes Placeholder 2"/>
+          <p:cNvSpPr>
+            <a:spLocks noGrp="1"/>
+          </p:cNvSpPr>
+          <p:nvPr>
+            <p:ph type="body" sz="quarter" idx="3"/>
+          </p:nvPr>
+        </p:nvSpPr>
+        <p:spPr/>
+        <p:txBody>
+          <a:bodyPr/>
+          <a:lstStyle/>
+          <a:p>
+            <a:r>
+              <a:t>What to say: "Huge gap: fitness apps, period trackers, mental health apps are NOT covered by HIPAA. They can sell your health data."</a:t>
+            </a:r>
+          </a:p>
+          <a:p>
+            <a:r>
+              <a:t>Recent case: BetterHelp (mental health app) fined $7.8M for sharing data with Facebook</a:t>
+            </a:r>
+          </a:p>
+          <a:p>
+            <a:r>
+              <a:t>URL: https://www.ftc.gov/news-events/news/press-releases/2023/03/ftc-ban-betterhelp-revealing-consumers-data-including-sensitive-mental-health-information-facebook</a:t>
+            </a:r>
+          </a:p>
+        </p:txBody>
+      </p:sp>
+      <p:sp>
+        <p:nvSpPr>
+          <p:cNvPr id="4" name="Slide Number Placeholder 3"/>
+          <p:cNvSpPr>
+            <a:spLocks noGrp="1"/>
+          </p:cNvSpPr>
+          <p:nvPr>
+            <p:ph type="sldNum" sz="quarter" idx="5"/>
+          </p:nvPr>
+        </p:nvSpPr>
+        <p:spPr/>
+      </p:sp>
+    </p:spTree>
+  </p:cSld>
+  <p:clrMapOvr>
+    <a:masterClrMapping/>
+  </p:clrMapOvr>
+</p:notes>
+</file>
+
+<file path=ppt/notesSlides/notesSlide21.xml><?xml version="1.0" encoding="utf-8"?>
+<p:notes xmlns:a="http://schemas.openxmlformats.org/drawingml/2006/main" xmlns:r="http://schemas.openxmlformats.org/officeDocument/2006/relationships" xmlns:p="http://schemas.openxmlformats.org/presentationml/2006/main">
+  <p:cSld>
+    <p:spTree>
+      <p:nvGrpSpPr>
+        <p:cNvPr id="1" name=""/>
+        <p:cNvGrpSpPr/>
+        <p:nvPr/>
+      </p:nvGrpSpPr>
+      <p:grpSpPr>
+        <a:xfrm>
+          <a:off x="0" y="0"/>
+          <a:ext cx="0" cy="0"/>
+          <a:chOff x="0" y="0"/>
+          <a:chExt cx="0" cy="0"/>
+        </a:xfrm>
+      </p:grpSpPr>
+      <p:sp>
+        <p:nvSpPr>
+          <p:cNvPr id="2" name="Slide Image Placeholder 1"/>
+          <p:cNvSpPr>
+            <a:spLocks noGrp="1" noRot="1" noChangeAspect="1"/>
+          </p:cNvSpPr>
+          <p:nvPr>
+            <p:ph type="sldImg" idx="2"/>
+          </p:nvPr>
+        </p:nvSpPr>
+        <p:spPr/>
+      </p:sp>
+      <p:sp>
+        <p:nvSpPr>
+          <p:cNvPr id="3" name="Notes Placeholder 2"/>
+          <p:cNvSpPr>
+            <a:spLocks noGrp="1"/>
+          </p:cNvSpPr>
+          <p:nvPr>
+            <p:ph type="body" sz="quarter" idx="3"/>
+          </p:nvPr>
+        </p:nvSpPr>
+        <p:spPr/>
+        <p:txBody>
+          <a:bodyPr/>
+          <a:lstStyle/>
+          <a:p>
+            <a:r>
+              <a:t>What to say: "Before 2003, companies could suffer massive breaches and never tell anyone. California changed everything." </a:t>
+            </a:r>
+          </a:p>
+        </p:txBody>
+      </p:sp>
+      <p:sp>
+        <p:nvSpPr>
+          <p:cNvPr id="4" name="Slide Number Placeholder 3"/>
+          <p:cNvSpPr>
+            <a:spLocks noGrp="1"/>
+          </p:cNvSpPr>
+          <p:nvPr>
+            <p:ph type="sldNum" sz="quarter" idx="5"/>
+          </p:nvPr>
+        </p:nvSpPr>
+        <p:spPr/>
+      </p:sp>
+    </p:spTree>
+  </p:cSld>
+  <p:clrMapOvr>
+    <a:masterClrMapping/>
+  </p:clrMapOvr>
+</p:notes>
+</file>
+
+<file path=ppt/notesSlides/notesSlide22.xml><?xml version="1.0" encoding="utf-8"?>
+<p:notes xmlns:a="http://schemas.openxmlformats.org/drawingml/2006/main" xmlns:r="http://schemas.openxmlformats.org/officeDocument/2006/relationships" xmlns:p="http://schemas.openxmlformats.org/presentationml/2006/main">
+  <p:cSld>
+    <p:spTree>
+      <p:nvGrpSpPr>
+        <p:cNvPr id="1" name=""/>
+        <p:cNvGrpSpPr/>
+        <p:nvPr/>
+      </p:nvGrpSpPr>
+      <p:grpSpPr>
+        <a:xfrm>
+          <a:off x="0" y="0"/>
+          <a:ext cx="0" cy="0"/>
+          <a:chOff x="0" y="0"/>
+          <a:chExt cx="0" cy="0"/>
+        </a:xfrm>
+      </p:grpSpPr>
+      <p:sp>
+        <p:nvSpPr>
+          <p:cNvPr id="2" name="Slide Image Placeholder 1"/>
+          <p:cNvSpPr>
+            <a:spLocks noGrp="1" noRot="1" noChangeAspect="1"/>
+          </p:cNvSpPr>
+          <p:nvPr>
+            <p:ph type="sldImg" idx="2"/>
+          </p:nvPr>
+        </p:nvSpPr>
+        <p:spPr/>
+      </p:sp>
+      <p:sp>
+        <p:nvSpPr>
+          <p:cNvPr id="3" name="Notes Placeholder 2"/>
+          <p:cNvSpPr>
+            <a:spLocks noGrp="1"/>
+          </p:cNvSpPr>
+          <p:nvPr>
+            <p:ph type="body" sz="quarter" idx="3"/>
+          </p:nvPr>
+        </p:nvSpPr>
+        <p:spPr/>
+        <p:txBody>
+          <a:bodyPr/>
+          <a:lstStyle/>
+          <a:p>
+            <a:r>
+              <a:t>What to say: "Now all 50 states have breach notification laws. Made security a board-level issue. If you get breached, it's front page news." </a:t>
+            </a:r>
+          </a:p>
+        </p:txBody>
+      </p:sp>
+      <p:sp>
+        <p:nvSpPr>
+          <p:cNvPr id="4" name="Slide Number Placeholder 3"/>
+          <p:cNvSpPr>
+            <a:spLocks noGrp="1"/>
+          </p:cNvSpPr>
+          <p:nvPr>
+            <p:ph type="sldNum" sz="quarter" idx="5"/>
+          </p:nvPr>
+        </p:nvSpPr>
+        <p:spPr/>
+      </p:sp>
+    </p:spTree>
+  </p:cSld>
+  <p:clrMapOvr>
+    <a:masterClrMapping/>
+  </p:clrMapOvr>
+</p:notes>
+</file>
+
+<file path=ppt/notesSlides/notesSlide23.xml><?xml version="1.0" encoding="utf-8"?>
+<p:notes xmlns:a="http://schemas.openxmlformats.org/drawingml/2006/main" xmlns:r="http://schemas.openxmlformats.org/officeDocument/2006/relationships" xmlns:p="http://schemas.openxmlformats.org/presentationml/2006/main">
+  <p:cSld>
+    <p:spTree>
+      <p:nvGrpSpPr>
+        <p:cNvPr id="1" name=""/>
+        <p:cNvGrpSpPr/>
+        <p:nvPr/>
+      </p:nvGrpSpPr>
+      <p:grpSpPr>
+        <a:xfrm>
+          <a:off x="0" y="0"/>
+          <a:ext cx="0" cy="0"/>
+          <a:chOff x="0" y="0"/>
+          <a:chExt cx="0" cy="0"/>
+        </a:xfrm>
+      </p:grpSpPr>
+      <p:sp>
+        <p:nvSpPr>
+          <p:cNvPr id="2" name="Slide Image Placeholder 1"/>
+          <p:cNvSpPr>
+            <a:spLocks noGrp="1" noRot="1" noChangeAspect="1"/>
+          </p:cNvSpPr>
+          <p:nvPr>
+            <p:ph type="sldImg" idx="2"/>
+          </p:nvPr>
+        </p:nvSpPr>
+        <p:spPr/>
+      </p:sp>
+      <p:sp>
+        <p:nvSpPr>
+          <p:cNvPr id="3" name="Notes Placeholder 2"/>
+          <p:cNvSpPr>
+            <a:spLocks noGrp="1"/>
+          </p:cNvSpPr>
+          <p:nvPr>
+            <p:ph type="body" sz="quarter" idx="3"/>
+          </p:nvPr>
+        </p:nvSpPr>
+        <p:spPr/>
+        <p:txBody>
+          <a:bodyPr/>
+          <a:lstStyle/>
+          <a:p>
+            <a:r>
+              <a:t>What to say: "Varies by state - this is the patchwork problem. Some states require notification for any breach, others only if 'harm likely.'" </a:t>
+            </a:r>
+          </a:p>
+        </p:txBody>
+      </p:sp>
+      <p:sp>
+        <p:nvSpPr>
+          <p:cNvPr id="4" name="Slide Number Placeholder 3"/>
+          <p:cNvSpPr>
+            <a:spLocks noGrp="1"/>
+          </p:cNvSpPr>
+          <p:nvPr>
+            <p:ph type="sldNum" sz="quarter" idx="5"/>
+          </p:nvPr>
+        </p:nvSpPr>
+        <p:spPr/>
+      </p:sp>
+    </p:spTree>
+  </p:cSld>
+  <p:clrMapOvr>
+    <a:masterClrMapping/>
+  </p:clrMapOvr>
+</p:notes>
+</file>
+
+<file path=ppt/notesSlides/notesSlide24.xml><?xml version="1.0" encoding="utf-8"?>
+<p:notes xmlns:a="http://schemas.openxmlformats.org/drawingml/2006/main" xmlns:r="http://schemas.openxmlformats.org/officeDocument/2006/relationships" xmlns:p="http://schemas.openxmlformats.org/presentationml/2006/main">
+  <p:cSld>
+    <p:spTree>
+      <p:nvGrpSpPr>
+        <p:cNvPr id="1" name=""/>
+        <p:cNvGrpSpPr/>
+        <p:nvPr/>
+      </p:nvGrpSpPr>
+      <p:grpSpPr>
+        <a:xfrm>
+          <a:off x="0" y="0"/>
+          <a:ext cx="0" cy="0"/>
+          <a:chOff x="0" y="0"/>
+          <a:chExt cx="0" cy="0"/>
+        </a:xfrm>
+      </p:grpSpPr>
+      <p:sp>
+        <p:nvSpPr>
+          <p:cNvPr id="2" name="Slide Image Placeholder 1"/>
+          <p:cNvSpPr>
+            <a:spLocks noGrp="1" noRot="1" noChangeAspect="1"/>
+          </p:cNvSpPr>
+          <p:nvPr>
+            <p:ph type="sldImg" idx="2"/>
+          </p:nvPr>
+        </p:nvSpPr>
+        <p:spPr/>
+      </p:sp>
+      <p:sp>
+        <p:nvSpPr>
+          <p:cNvPr id="3" name="Notes Placeholder 2"/>
+          <p:cNvSpPr>
+            <a:spLocks noGrp="1"/>
+          </p:cNvSpPr>
+          <p:nvPr>
+            <p:ph type="body" sz="quarter" idx="3"/>
+          </p:nvPr>
+        </p:nvSpPr>
+        <p:spPr/>
+        <p:txBody>
+          <a:bodyPr/>
+          <a:lstStyle/>
+          <a:p>
+            <a:r>
+              <a:t>What to say: "Companies just apply the strictest state law (usually California) to everyone. Easier than 50 different compliance regimes." </a:t>
+            </a:r>
+          </a:p>
+        </p:txBody>
+      </p:sp>
+      <p:sp>
+        <p:nvSpPr>
+          <p:cNvPr id="4" name="Slide Number Placeholder 3"/>
+          <p:cNvSpPr>
+            <a:spLocks noGrp="1"/>
+          </p:cNvSpPr>
+          <p:nvPr>
+            <p:ph type="sldNum" sz="quarter" idx="5"/>
+          </p:nvPr>
+        </p:nvSpPr>
+        <p:spPr/>
+      </p:sp>
+    </p:spTree>
+  </p:cSld>
+  <p:clrMapOvr>
+    <a:masterClrMapping/>
+  </p:clrMapOvr>
+</p:notes>
+</file>
+
+<file path=ppt/notesSlides/notesSlide25.xml><?xml version="1.0" encoding="utf-8"?>
+<p:notes xmlns:a="http://schemas.openxmlformats.org/drawingml/2006/main" xmlns:r="http://schemas.openxmlformats.org/officeDocument/2006/relationships" xmlns:p="http://schemas.openxmlformats.org/presentationml/2006/main">
+  <p:cSld>
+    <p:spTree>
+      <p:nvGrpSpPr>
+        <p:cNvPr id="1" name=""/>
+        <p:cNvGrpSpPr/>
+        <p:nvPr/>
+      </p:nvGrpSpPr>
+      <p:grpSpPr>
+        <a:xfrm>
+          <a:off x="0" y="0"/>
+          <a:ext cx="0" cy="0"/>
+          <a:chOff x="0" y="0"/>
+          <a:chExt cx="0" cy="0"/>
+        </a:xfrm>
+      </p:grpSpPr>
+      <p:sp>
+        <p:nvSpPr>
+          <p:cNvPr id="2" name="Slide Image Placeholder 1"/>
+          <p:cNvSpPr>
+            <a:spLocks noGrp="1" noRot="1" noChangeAspect="1"/>
+          </p:cNvSpPr>
+          <p:nvPr>
+            <p:ph type="sldImg" idx="2"/>
+          </p:nvPr>
+        </p:nvSpPr>
+        <p:spPr/>
+      </p:sp>
+      <p:sp>
+        <p:nvSpPr>
+          <p:cNvPr id="3" name="Notes Placeholder 2"/>
+          <p:cNvSpPr>
+            <a:spLocks noGrp="1"/>
+          </p:cNvSpPr>
+          <p:nvPr>
+            <p:ph type="body" sz="quarter" idx="3"/>
+          </p:nvPr>
+        </p:nvSpPr>
+        <p:spPr/>
+        <p:txBody>
+          <a:bodyPr/>
+          <a:lstStyle/>
+          <a:p>
+            <a:r>
+              <a:t>What to say: "147 million Americans' data breached. Equifax's response was a disaster: took 6 weeks to disclose, set up fake-looking website, tried to profit from credit monitoring."</a:t>
+            </a:r>
+          </a:p>
+          <a:p>
+            <a:r>
+              <a:t>URL: https://www.ftc.gov/equifax-data-breach</a:t>
+            </a:r>
+          </a:p>
+          <a:p>
+            <a:r>
+              <a:t>Result: $700M settlement, CEO resigned</a:t>
+            </a:r>
+          </a:p>
+        </p:txBody>
+      </p:sp>
+      <p:sp>
+        <p:nvSpPr>
+          <p:cNvPr id="4" name="Slide Number Placeholder 3"/>
+          <p:cNvSpPr>
+            <a:spLocks noGrp="1"/>
+          </p:cNvSpPr>
+          <p:nvPr>
+            <p:ph type="sldNum" sz="quarter" idx="5"/>
+          </p:nvPr>
+        </p:nvSpPr>
+        <p:spPr/>
+      </p:sp>
+    </p:spTree>
+  </p:cSld>
+  <p:clrMapOvr>
+    <a:masterClrMapping/>
+  </p:clrMapOvr>
+</p:notes>
+</file>
+
+<file path=ppt/notesSlides/notesSlide26.xml><?xml version="1.0" encoding="utf-8"?>
+<p:notes xmlns:a="http://schemas.openxmlformats.org/drawingml/2006/main" xmlns:r="http://schemas.openxmlformats.org/officeDocument/2006/relationships" xmlns:p="http://schemas.openxmlformats.org/presentationml/2006/main">
+  <p:cSld>
+    <p:spTree>
+      <p:nvGrpSpPr>
+        <p:cNvPr id="1" name=""/>
+        <p:cNvGrpSpPr/>
+        <p:nvPr/>
+      </p:nvGrpSpPr>
+      <p:grpSpPr>
+        <a:xfrm>
+          <a:off x="0" y="0"/>
+          <a:ext cx="0" cy="0"/>
+          <a:chOff x="0" y="0"/>
+          <a:chExt cx="0" cy="0"/>
+        </a:xfrm>
+      </p:grpSpPr>
+      <p:sp>
+        <p:nvSpPr>
+          <p:cNvPr id="2" name="Slide Image Placeholder 1"/>
+          <p:cNvSpPr>
+            <a:spLocks noGrp="1" noRot="1" noChangeAspect="1"/>
+          </p:cNvSpPr>
+          <p:nvPr>
+            <p:ph type="sldImg" idx="2"/>
+          </p:nvPr>
+        </p:nvSpPr>
+        <p:spPr/>
+      </p:sp>
+      <p:sp>
+        <p:nvSpPr>
+          <p:cNvPr id="3" name="Notes Placeholder 2"/>
+          <p:cNvSpPr>
+            <a:spLocks noGrp="1"/>
+          </p:cNvSpPr>
+          <p:nvPr>
+            <p:ph type="body" sz="quarter" idx="3"/>
+          </p:nvPr>
+        </p:nvSpPr>
+        <p:spPr/>
+        <p:txBody>
+          <a:bodyPr/>
+          <a:lstStyle/>
+          <a:p>
+            <a:r>
+              <a:t>What to say: "FTC is the de facto privacy regulator in the US, but they don't have a specific privacy statute. They use Section 5..." </a:t>
+            </a:r>
+          </a:p>
+        </p:txBody>
+      </p:sp>
+      <p:sp>
+        <p:nvSpPr>
+          <p:cNvPr id="4" name="Slide Number Placeholder 3"/>
+          <p:cNvSpPr>
+            <a:spLocks noGrp="1"/>
+          </p:cNvSpPr>
+          <p:nvPr>
+            <p:ph type="sldNum" sz="quarter" idx="5"/>
+          </p:nvPr>
+        </p:nvSpPr>
+        <p:spPr/>
+      </p:sp>
+    </p:spTree>
+  </p:cSld>
+  <p:clrMapOvr>
+    <a:masterClrMapping/>
+  </p:clrMapOvr>
+</p:notes>
+</file>
+
+<file path=ppt/notesSlides/notesSlide27.xml><?xml version="1.0" encoding="utf-8"?>
+<p:notes xmlns:a="http://schemas.openxmlformats.org/drawingml/2006/main" xmlns:r="http://schemas.openxmlformats.org/officeDocument/2006/relationships" xmlns:p="http://schemas.openxmlformats.org/presentationml/2006/main">
+  <p:cSld>
+    <p:spTree>
+      <p:nvGrpSpPr>
+        <p:cNvPr id="1" name=""/>
+        <p:cNvGrpSpPr/>
+        <p:nvPr/>
+      </p:nvGrpSpPr>
+      <p:grpSpPr>
+        <a:xfrm>
+          <a:off x="0" y="0"/>
+          <a:ext cx="0" cy="0"/>
+          <a:chOff x="0" y="0"/>
+          <a:chExt cx="0" cy="0"/>
+        </a:xfrm>
+      </p:grpSpPr>
+      <p:sp>
+        <p:nvSpPr>
+          <p:cNvPr id="2" name="Slide Image Placeholder 1"/>
+          <p:cNvSpPr>
+            <a:spLocks noGrp="1" noRot="1" noChangeAspect="1"/>
+          </p:cNvSpPr>
+          <p:nvPr>
             <p:ph type="sldImg"/>
           </p:nvPr>
         </p:nvSpPr>
@@ -634,244 +2022,18 @@
           <a:lstStyle/>
           <a:p>
             <a:r>
-              <a:rPr lang="en-US" sz="1200" b="0" i="0" kern="1200" dirty="0">
-                <a:solidFill>
-                  <a:schemeClr val="tx1"/>
-                </a:solidFill>
-                <a:effectLst/>
-                <a:latin typeface="+mn-lt"/>
-                <a:ea typeface="+mn-ea"/>
-                <a:cs typeface="+mn-cs"/>
-              </a:rPr>
-              <a:t>First, with new computerized collections </a:t>
-            </a:r>
-          </a:p>
-          <a:p>
-            <a:r>
-              <a:rPr lang="en-US" sz="1200" b="0" i="0" kern="1200" dirty="0">
-                <a:solidFill>
-                  <a:schemeClr val="tx1"/>
-                </a:solidFill>
-                <a:effectLst/>
-                <a:latin typeface="+mn-lt"/>
-                <a:ea typeface="+mn-ea"/>
-                <a:cs typeface="+mn-cs"/>
-              </a:rPr>
-              <a:t>of personal information, </a:t>
-            </a:r>
-          </a:p>
-          <a:p>
-            <a:r>
-              <a:rPr lang="en-US" sz="1200" b="0" i="0" kern="1200" dirty="0">
-                <a:solidFill>
-                  <a:schemeClr val="tx1"/>
-                </a:solidFill>
-                <a:effectLst/>
-                <a:latin typeface="+mn-lt"/>
-                <a:ea typeface="+mn-ea"/>
-                <a:cs typeface="+mn-cs"/>
-              </a:rPr>
-              <a:t>you might have an unknown database </a:t>
-            </a:r>
-          </a:p>
-          <a:p>
-            <a:r>
-              <a:rPr lang="en-US" sz="1200" b="0" i="0" kern="1200" dirty="0">
-                <a:solidFill>
-                  <a:schemeClr val="tx1"/>
-                </a:solidFill>
-                <a:effectLst/>
-                <a:latin typeface="+mn-lt"/>
-                <a:ea typeface="+mn-ea"/>
-                <a:cs typeface="+mn-cs"/>
-              </a:rPr>
-              <a:t>that contains information about you. </a:t>
-            </a:r>
-          </a:p>
-          <a:p>
-            <a:r>
-              <a:rPr lang="en-US" sz="1200" b="0" i="0" kern="1200" dirty="0">
-                <a:solidFill>
-                  <a:schemeClr val="tx1"/>
-                </a:solidFill>
-                <a:effectLst/>
-                <a:latin typeface="+mn-lt"/>
-                <a:ea typeface="+mn-ea"/>
-                <a:cs typeface="+mn-cs"/>
-              </a:rPr>
-              <a:t>Second, computerized compilations enabled </a:t>
-            </a:r>
-          </a:p>
-          <a:p>
-            <a:r>
-              <a:rPr lang="en-US" sz="1200" b="0" i="0" kern="1200" dirty="0">
-                <a:solidFill>
-                  <a:schemeClr val="tx1"/>
-                </a:solidFill>
-                <a:effectLst/>
-                <a:latin typeface="+mn-lt"/>
-                <a:ea typeface="+mn-ea"/>
-                <a:cs typeface="+mn-cs"/>
-              </a:rPr>
-              <a:t>the collection of large amounts of </a:t>
-            </a:r>
-          </a:p>
-          <a:p>
-            <a:r>
-              <a:rPr lang="en-US" sz="1200" b="0" i="0" kern="1200" dirty="0">
-                <a:solidFill>
-                  <a:schemeClr val="tx1"/>
-                </a:solidFill>
-                <a:effectLst/>
-                <a:latin typeface="+mn-lt"/>
-                <a:ea typeface="+mn-ea"/>
-                <a:cs typeface="+mn-cs"/>
-              </a:rPr>
-              <a:t>information in cost effective ways. </a:t>
-            </a:r>
-          </a:p>
-          <a:p>
-            <a:r>
-              <a:rPr lang="en-US" sz="1200" b="0" i="0" kern="1200" dirty="0">
-                <a:solidFill>
-                  <a:schemeClr val="tx1"/>
-                </a:solidFill>
-                <a:effectLst/>
-                <a:latin typeface="+mn-lt"/>
-                <a:ea typeface="+mn-ea"/>
-                <a:cs typeface="+mn-cs"/>
-              </a:rPr>
-              <a:t>Third, with computers, you could have </a:t>
-            </a:r>
-          </a:p>
-          <a:p>
-            <a:r>
-              <a:rPr lang="en-US" sz="1200" b="0" i="0" kern="1200" dirty="0">
-                <a:solidFill>
-                  <a:schemeClr val="tx1"/>
-                </a:solidFill>
-                <a:effectLst/>
-                <a:latin typeface="+mn-lt"/>
-                <a:ea typeface="+mn-ea"/>
-                <a:cs typeface="+mn-cs"/>
-              </a:rPr>
-              <a:t>easy dissemination of personal information </a:t>
-            </a:r>
-          </a:p>
-          <a:p>
-            <a:r>
-              <a:rPr lang="en-US" sz="1200" b="0" i="0" kern="1200" dirty="0">
-                <a:solidFill>
-                  <a:schemeClr val="tx1"/>
-                </a:solidFill>
-                <a:effectLst/>
-                <a:latin typeface="+mn-lt"/>
-                <a:ea typeface="+mn-ea"/>
-                <a:cs typeface="+mn-cs"/>
-              </a:rPr>
-              <a:t>to many, many people. </a:t>
-            </a:r>
-          </a:p>
-          <a:p>
-            <a:r>
-              <a:rPr lang="en-US" sz="1200" b="0" i="0" kern="1200" dirty="0">
-                <a:solidFill>
-                  <a:schemeClr val="tx1"/>
-                </a:solidFill>
-                <a:effectLst/>
-                <a:latin typeface="+mn-lt"/>
-                <a:ea typeface="+mn-ea"/>
-                <a:cs typeface="+mn-cs"/>
-              </a:rPr>
-              <a:t>Fourth, computers facilitated the collection </a:t>
-            </a:r>
-          </a:p>
-          <a:p>
-            <a:r>
-              <a:rPr lang="en-US" sz="1200" b="0" i="0" kern="1200" dirty="0">
-                <a:solidFill>
-                  <a:schemeClr val="tx1"/>
-                </a:solidFill>
-                <a:effectLst/>
-                <a:latin typeface="+mn-lt"/>
-                <a:ea typeface="+mn-ea"/>
-                <a:cs typeface="+mn-cs"/>
-              </a:rPr>
-              <a:t>of different types of information </a:t>
-            </a:r>
-          </a:p>
-          <a:p>
-            <a:r>
-              <a:rPr lang="en-US" sz="1200" b="0" i="0" kern="1200" dirty="0">
-                <a:solidFill>
-                  <a:schemeClr val="tx1"/>
-                </a:solidFill>
-                <a:effectLst/>
-                <a:latin typeface="+mn-lt"/>
-                <a:ea typeface="+mn-ea"/>
-                <a:cs typeface="+mn-cs"/>
-              </a:rPr>
-              <a:t>than was previously collected, </a:t>
-            </a:r>
-          </a:p>
-          <a:p>
-            <a:r>
-              <a:rPr lang="en-US" sz="1200" b="0" i="0" kern="1200" dirty="0">
-                <a:solidFill>
-                  <a:schemeClr val="tx1"/>
-                </a:solidFill>
-                <a:effectLst/>
-                <a:latin typeface="+mn-lt"/>
-                <a:ea typeface="+mn-ea"/>
-                <a:cs typeface="+mn-cs"/>
-              </a:rPr>
-              <a:t>again, because it was so cost effective to do so. </a:t>
-            </a:r>
-          </a:p>
-          <a:p>
-            <a:r>
-              <a:rPr lang="en-US" sz="1200" b="0" i="0" kern="1200" dirty="0">
-                <a:solidFill>
-                  <a:schemeClr val="tx1"/>
-                </a:solidFill>
-                <a:effectLst/>
-                <a:latin typeface="+mn-lt"/>
-                <a:ea typeface="+mn-ea"/>
-                <a:cs typeface="+mn-cs"/>
-              </a:rPr>
-              <a:t>Fifth, information collected through computers </a:t>
-            </a:r>
-          </a:p>
-          <a:p>
-            <a:r>
-              <a:rPr lang="en-US" sz="1200" b="0" i="0" kern="1200" dirty="0">
-                <a:solidFill>
-                  <a:schemeClr val="tx1"/>
-                </a:solidFill>
-                <a:effectLst/>
-                <a:latin typeface="+mn-lt"/>
-                <a:ea typeface="+mn-ea"/>
-                <a:cs typeface="+mn-cs"/>
-              </a:rPr>
-              <a:t>started to be used in </a:t>
-            </a:r>
-          </a:p>
-          <a:p>
-            <a:r>
-              <a:rPr lang="en-US" sz="1200" b="0" i="0" kern="1200" dirty="0">
-                <a:solidFill>
-                  <a:schemeClr val="tx1"/>
-                </a:solidFill>
-                <a:effectLst/>
-                <a:latin typeface="+mn-lt"/>
-                <a:ea typeface="+mn-ea"/>
-                <a:cs typeface="+mn-cs"/>
-              </a:rPr>
-              <a:t>different ways than it was previously. </a:t>
-            </a:r>
-          </a:p>
-          <a:p>
-            <a:endParaRPr lang="en-US" dirty="0"/>
+              <a:t>What to say: "Section 5 bans 'unfair or deceptive' practices. FTC stretches this to cover privacy. Not ideal - built for consumer protection, not privacy rights."</a:t>
+            </a:r>
+          </a:p>
+          <a:p>
+            <a:r>
+              <a:t>Deceptive: You promised X, did Y</a:t>
+            </a:r>
+          </a:p>
+          <a:p>
+            <a:r>
+              <a:t>Unfair: Causes substantial harm consumers can't avoid</a:t>
+            </a:r>
           </a:p>
         </p:txBody>
       </p:sp>
@@ -892,7 +2054,7 @@
           <a:p>
             <a:fld id="{19237381-9D2A-0D46-A31D-B9FCFAE45650}" type="slidenum">
               <a:rPr lang="en-US" smtClean="0"/>
-              <a:t>3</a:t>
+              <a:t>31</a:t>
             </a:fld>
             <a:endParaRPr lang="en-US"/>
           </a:p>
@@ -901,7 +2063,183 @@
     </p:spTree>
     <p:extLst>
       <p:ext uri="{BB962C8B-B14F-4D97-AF65-F5344CB8AC3E}">
-        <p14:creationId xmlns:p14="http://schemas.microsoft.com/office/powerpoint/2010/main" val="3518404850"/>
+        <p14:creationId xmlns:p14="http://schemas.microsoft.com/office/powerpoint/2010/main" val="2369549844"/>
+      </p:ext>
+    </p:extLst>
+  </p:cSld>
+  <p:clrMapOvr>
+    <a:masterClrMapping/>
+  </p:clrMapOvr>
+</p:notes>
+</file>
+
+<file path=ppt/notesSlides/notesSlide28.xml><?xml version="1.0" encoding="utf-8"?>
+<p:notes xmlns:a="http://schemas.openxmlformats.org/drawingml/2006/main" xmlns:r="http://schemas.openxmlformats.org/officeDocument/2006/relationships" xmlns:p="http://schemas.openxmlformats.org/presentationml/2006/main">
+  <p:cSld>
+    <p:spTree>
+      <p:nvGrpSpPr>
+        <p:cNvPr id="1" name=""/>
+        <p:cNvGrpSpPr/>
+        <p:nvPr/>
+      </p:nvGrpSpPr>
+      <p:grpSpPr>
+        <a:xfrm>
+          <a:off x="0" y="0"/>
+          <a:ext cx="0" cy="0"/>
+          <a:chOff x="0" y="0"/>
+          <a:chExt cx="0" cy="0"/>
+        </a:xfrm>
+      </p:grpSpPr>
+      <p:sp>
+        <p:nvSpPr>
+          <p:cNvPr id="2" name="Slide Image Placeholder 1"/>
+          <p:cNvSpPr>
+            <a:spLocks noGrp="1" noRot="1" noChangeAspect="1"/>
+          </p:cNvSpPr>
+          <p:nvPr>
+            <p:ph type="sldImg" idx="2"/>
+          </p:nvPr>
+        </p:nvSpPr>
+        <p:spPr/>
+      </p:sp>
+      <p:sp>
+        <p:nvSpPr>
+          <p:cNvPr id="3" name="Notes Placeholder 2"/>
+          <p:cNvSpPr>
+            <a:spLocks noGrp="1"/>
+          </p:cNvSpPr>
+          <p:nvPr>
+            <p:ph type="body" sz="quarter" idx="3"/>
+          </p:nvPr>
+        </p:nvSpPr>
+        <p:spPr/>
+        <p:txBody>
+          <a:bodyPr/>
+          <a:lstStyle/>
+          <a:p>
+            <a:r>
+              <a:t>What to say: "Uber claimed 'God View' tracking of users was limited. FTC found they were monitoring journalists, politicians, exes. Settled with consent decree."</a:t>
+            </a:r>
+          </a:p>
+          <a:p>
+            <a:r>
+              <a:t>URL: https://www.ftc.gov/news-events/news/press-releases/2017/08/uber-settles-ftc-allegations-it-made-deceptive-privacy-data-security-claims</a:t>
+            </a:r>
+          </a:p>
+        </p:txBody>
+      </p:sp>
+      <p:sp>
+        <p:nvSpPr>
+          <p:cNvPr id="4" name="Slide Number Placeholder 3"/>
+          <p:cNvSpPr>
+            <a:spLocks noGrp="1"/>
+          </p:cNvSpPr>
+          <p:nvPr>
+            <p:ph type="sldNum" sz="quarter" idx="5"/>
+          </p:nvPr>
+        </p:nvSpPr>
+        <p:spPr/>
+      </p:sp>
+    </p:spTree>
+  </p:cSld>
+  <p:clrMapOvr>
+    <a:masterClrMapping/>
+  </p:clrMapOvr>
+</p:notes>
+</file>
+
+<file path=ppt/notesSlides/notesSlide29.xml><?xml version="1.0" encoding="utf-8"?>
+<p:notes xmlns:a="http://schemas.openxmlformats.org/drawingml/2006/main" xmlns:r="http://schemas.openxmlformats.org/officeDocument/2006/relationships" xmlns:p="http://schemas.openxmlformats.org/presentationml/2006/main">
+  <p:cSld>
+    <p:spTree>
+      <p:nvGrpSpPr>
+        <p:cNvPr id="1" name=""/>
+        <p:cNvGrpSpPr/>
+        <p:nvPr/>
+      </p:nvGrpSpPr>
+      <p:grpSpPr>
+        <a:xfrm>
+          <a:off x="0" y="0"/>
+          <a:ext cx="0" cy="0"/>
+          <a:chOff x="0" y="0"/>
+          <a:chExt cx="0" cy="0"/>
+        </a:xfrm>
+      </p:grpSpPr>
+      <p:sp>
+        <p:nvSpPr>
+          <p:cNvPr id="2" name="Slide Image Placeholder 1"/>
+          <p:cNvSpPr>
+            <a:spLocks noGrp="1" noRot="1" noChangeAspect="1"/>
+          </p:cNvSpPr>
+          <p:nvPr>
+            <p:ph type="sldImg"/>
+          </p:nvPr>
+        </p:nvSpPr>
+        <p:spPr/>
+      </p:sp>
+      <p:sp>
+        <p:nvSpPr>
+          <p:cNvPr id="3" name="Notes Placeholder 2"/>
+          <p:cNvSpPr>
+            <a:spLocks noGrp="1"/>
+          </p:cNvSpPr>
+          <p:nvPr>
+            <p:ph type="body" idx="1"/>
+          </p:nvPr>
+        </p:nvSpPr>
+        <p:spPr/>
+        <p:txBody>
+          <a:bodyPr/>
+          <a:lstStyle/>
+          <a:p>
+            <a:r>
+              <a:t>Context: 2011 consent decree, then Cambridge Analytica 2018</a:t>
+            </a:r>
+          </a:p>
+          <a:p>
+            <a:r>
+              <a:t>What to say: "Facebook settled with FTC in 2011 for privacy violations. Consent decree required audits, compliance. Then Cambridge Analytica happened - 87 million users' data harvested. Did Facebook violate the decree?"</a:t>
+            </a:r>
+          </a:p>
+          <a:p>
+            <a:r>
+              <a:t>URL: https://www.ftc.gov/news-events/news/press-releases/2019/07/ftc-imposes-5-billion-penalty-sweeping-new-privacy-restrictions-facebook</a:t>
+            </a:r>
+          </a:p>
+          <a:p>
+            <a:r>
+              <a:t>Result: $5 billion fine (2019) - largest FTC penalty ever</a:t>
+            </a:r>
+          </a:p>
+        </p:txBody>
+      </p:sp>
+      <p:sp>
+        <p:nvSpPr>
+          <p:cNvPr id="4" name="Slide Number Placeholder 3"/>
+          <p:cNvSpPr>
+            <a:spLocks noGrp="1"/>
+          </p:cNvSpPr>
+          <p:nvPr>
+            <p:ph type="sldNum" sz="quarter" idx="5"/>
+          </p:nvPr>
+        </p:nvSpPr>
+        <p:spPr/>
+        <p:txBody>
+          <a:bodyPr/>
+          <a:lstStyle/>
+          <a:p>
+            <a:fld id="{19237381-9D2A-0D46-A31D-B9FCFAE45650}" type="slidenum">
+              <a:rPr lang="en-US" smtClean="0"/>
+              <a:t>33</a:t>
+            </a:fld>
+            <a:endParaRPr lang="en-US"/>
+          </a:p>
+        </p:txBody>
+      </p:sp>
+    </p:spTree>
+    <p:extLst>
+      <p:ext uri="{BB962C8B-B14F-4D97-AF65-F5344CB8AC3E}">
+        <p14:creationId xmlns:p14="http://schemas.microsoft.com/office/powerpoint/2010/main" val="3669808676"/>
       </p:ext>
     </p:extLst>
   </p:cSld>
@@ -955,7 +2293,14 @@
           <a:bodyPr/>
           <a:lstStyle/>
           <a:p>
-            <a:endParaRPr lang="en-US" dirty="0"/>
+            <a:r>
+              <a:t>Context: 1970s concerns about mainframe computers</a:t>
+            </a:r>
+          </a:p>
+          <a:p>
+            <a:r>
+              <a:t>What to say: "These concerns from the 1970s sound quaint now, but they led to the Fair Information Practice Principles. Notice how every concern is 100x worse today with cloud computing and smartphones." </a:t>
+            </a:r>
           </a:p>
         </p:txBody>
       </p:sp>
@@ -966,17 +2311,17 @@
             <a:spLocks noGrp="1"/>
           </p:cNvSpPr>
           <p:nvPr>
-            <p:ph type="sldNum" sz="quarter" idx="10"/>
-          </p:nvPr>
-        </p:nvSpPr>
-        <p:spPr/>
-        <p:txBody>
-          <a:bodyPr/>
-          <a:lstStyle/>
-          <a:p>
-            <a:fld id="{60EA165A-C3FE-834A-926F-47D8C9BA346E}" type="slidenum">
+            <p:ph type="sldNum" sz="quarter" idx="5"/>
+          </p:nvPr>
+        </p:nvSpPr>
+        <p:spPr/>
+        <p:txBody>
+          <a:bodyPr/>
+          <a:lstStyle/>
+          <a:p>
+            <a:fld id="{19237381-9D2A-0D46-A31D-B9FCFAE45650}" type="slidenum">
               <a:rPr lang="en-US" smtClean="0"/>
-              <a:t>15</a:t>
+              <a:t>3</a:t>
             </a:fld>
             <a:endParaRPr lang="en-US"/>
           </a:p>
@@ -985,7 +2330,633 @@
     </p:spTree>
     <p:extLst>
       <p:ext uri="{BB962C8B-B14F-4D97-AF65-F5344CB8AC3E}">
-        <p14:creationId xmlns:p14="http://schemas.microsoft.com/office/powerpoint/2010/main" val="309170325"/>
+        <p14:creationId xmlns:p14="http://schemas.microsoft.com/office/powerpoint/2010/main" val="3518404850"/>
+      </p:ext>
+    </p:extLst>
+  </p:cSld>
+  <p:clrMapOvr>
+    <a:masterClrMapping/>
+  </p:clrMapOvr>
+</p:notes>
+</file>
+
+<file path=ppt/notesSlides/notesSlide30.xml><?xml version="1.0" encoding="utf-8"?>
+<p:notes xmlns:a="http://schemas.openxmlformats.org/drawingml/2006/main" xmlns:r="http://schemas.openxmlformats.org/officeDocument/2006/relationships" xmlns:p="http://schemas.openxmlformats.org/presentationml/2006/main">
+  <p:cSld>
+    <p:spTree>
+      <p:nvGrpSpPr>
+        <p:cNvPr id="1" name=""/>
+        <p:cNvGrpSpPr/>
+        <p:nvPr/>
+      </p:nvGrpSpPr>
+      <p:grpSpPr>
+        <a:xfrm>
+          <a:off x="0" y="0"/>
+          <a:ext cx="0" cy="0"/>
+          <a:chOff x="0" y="0"/>
+          <a:chExt cx="0" cy="0"/>
+        </a:xfrm>
+      </p:grpSpPr>
+      <p:sp>
+        <p:nvSpPr>
+          <p:cNvPr id="2" name="Slide Image Placeholder 1"/>
+          <p:cNvSpPr>
+            <a:spLocks noGrp="1" noRot="1" noChangeAspect="1"/>
+          </p:cNvSpPr>
+          <p:nvPr>
+            <p:ph type="sldImg" idx="2"/>
+          </p:nvPr>
+        </p:nvSpPr>
+        <p:spPr/>
+      </p:sp>
+      <p:sp>
+        <p:nvSpPr>
+          <p:cNvPr id="3" name="Notes Placeholder 2"/>
+          <p:cNvSpPr>
+            <a:spLocks noGrp="1"/>
+          </p:cNvSpPr>
+          <p:nvPr>
+            <p:ph type="body" sz="quarter" idx="3"/>
+          </p:nvPr>
+        </p:nvSpPr>
+        <p:spPr/>
+        <p:txBody>
+          <a:bodyPr/>
+          <a:lstStyle/>
+          <a:p>
+            <a:r>
+              <a:t>What to say: "2019 consent decree is much stricter. Two-factor authentication phone numbers were being used for ads - now prohibited. Facial recognition requires explicit consent." </a:t>
+            </a:r>
+          </a:p>
+        </p:txBody>
+      </p:sp>
+      <p:sp>
+        <p:nvSpPr>
+          <p:cNvPr id="4" name="Slide Number Placeholder 3"/>
+          <p:cNvSpPr>
+            <a:spLocks noGrp="1"/>
+          </p:cNvSpPr>
+          <p:nvPr>
+            <p:ph type="sldNum" sz="quarter" idx="5"/>
+          </p:nvPr>
+        </p:nvSpPr>
+        <p:spPr/>
+      </p:sp>
+    </p:spTree>
+  </p:cSld>
+  <p:clrMapOvr>
+    <a:masterClrMapping/>
+  </p:clrMapOvr>
+</p:notes>
+</file>
+
+<file path=ppt/notesSlides/notesSlide31.xml><?xml version="1.0" encoding="utf-8"?>
+<p:notes xmlns:a="http://schemas.openxmlformats.org/drawingml/2006/main" xmlns:r="http://schemas.openxmlformats.org/officeDocument/2006/relationships" xmlns:p="http://schemas.openxmlformats.org/presentationml/2006/main">
+  <p:cSld>
+    <p:spTree>
+      <p:nvGrpSpPr>
+        <p:cNvPr id="1" name=""/>
+        <p:cNvGrpSpPr/>
+        <p:nvPr/>
+      </p:nvGrpSpPr>
+      <p:grpSpPr>
+        <a:xfrm>
+          <a:off x="0" y="0"/>
+          <a:ext cx="0" cy="0"/>
+          <a:chOff x="0" y="0"/>
+          <a:chExt cx="0" cy="0"/>
+        </a:xfrm>
+      </p:grpSpPr>
+      <p:sp>
+        <p:nvSpPr>
+          <p:cNvPr id="2" name="Slide Image Placeholder 1"/>
+          <p:cNvSpPr>
+            <a:spLocks noGrp="1" noRot="1" noChangeAspect="1"/>
+          </p:cNvSpPr>
+          <p:nvPr>
+            <p:ph type="sldImg" idx="2"/>
+          </p:nvPr>
+        </p:nvSpPr>
+        <p:spPr/>
+      </p:sp>
+      <p:sp>
+        <p:nvSpPr>
+          <p:cNvPr id="3" name="Notes Placeholder 2"/>
+          <p:cNvSpPr>
+            <a:spLocks noGrp="1"/>
+          </p:cNvSpPr>
+          <p:nvPr>
+            <p:ph type="body" sz="quarter" idx="3"/>
+          </p:nvPr>
+        </p:nvSpPr>
+        <p:spPr/>
+        <p:txBody>
+          <a:bodyPr/>
+          <a:lstStyle/>
+          <a:p>
+            <a:r>
+              <a:t>What to say: "140+ countries have privacy laws. EU's GDPR is the most influential - it has extraterritorial reach, so it affects US companies too." </a:t>
+            </a:r>
+          </a:p>
+        </p:txBody>
+      </p:sp>
+      <p:sp>
+        <p:nvSpPr>
+          <p:cNvPr id="4" name="Slide Number Placeholder 3"/>
+          <p:cNvSpPr>
+            <a:spLocks noGrp="1"/>
+          </p:cNvSpPr>
+          <p:nvPr>
+            <p:ph type="sldNum" sz="quarter" idx="5"/>
+          </p:nvPr>
+        </p:nvSpPr>
+        <p:spPr/>
+      </p:sp>
+    </p:spTree>
+  </p:cSld>
+  <p:clrMapOvr>
+    <a:masterClrMapping/>
+  </p:clrMapOvr>
+</p:notes>
+</file>
+
+<file path=ppt/notesSlides/notesSlide32.xml><?xml version="1.0" encoding="utf-8"?>
+<p:notes xmlns:a="http://schemas.openxmlformats.org/drawingml/2006/main" xmlns:r="http://schemas.openxmlformats.org/officeDocument/2006/relationships" xmlns:p="http://schemas.openxmlformats.org/presentationml/2006/main">
+  <p:cSld>
+    <p:spTree>
+      <p:nvGrpSpPr>
+        <p:cNvPr id="1" name=""/>
+        <p:cNvGrpSpPr/>
+        <p:nvPr/>
+      </p:nvGrpSpPr>
+      <p:grpSpPr>
+        <a:xfrm>
+          <a:off x="0" y="0"/>
+          <a:ext cx="0" cy="0"/>
+          <a:chOff x="0" y="0"/>
+          <a:chExt cx="0" cy="0"/>
+        </a:xfrm>
+      </p:grpSpPr>
+      <p:sp>
+        <p:nvSpPr>
+          <p:cNvPr id="2" name="Slide Image Placeholder 1"/>
+          <p:cNvSpPr>
+            <a:spLocks noGrp="1" noRot="1" noChangeAspect="1"/>
+          </p:cNvSpPr>
+          <p:nvPr>
+            <p:ph type="sldImg" idx="2"/>
+          </p:nvPr>
+        </p:nvSpPr>
+        <p:spPr/>
+      </p:sp>
+      <p:sp>
+        <p:nvSpPr>
+          <p:cNvPr id="3" name="Notes Placeholder 2"/>
+          <p:cNvSpPr>
+            <a:spLocks noGrp="1"/>
+          </p:cNvSpPr>
+          <p:nvPr>
+            <p:ph type="body" sz="quarter" idx="3"/>
+          </p:nvPr>
+        </p:nvSpPr>
+        <p:spPr/>
+        <p:txBody>
+          <a:bodyPr/>
+          <a:lstStyle/>
+          <a:p>
+            <a:r>
+              <a:t>What to say: "GDPR applies to ANY company offering services to EU residents. US companies must comply. This is regulatory imperialism - EU law governing US companies."</a:t>
+            </a:r>
+          </a:p>
+          <a:p>
+            <a:r>
+              <a:t>Example: If you have a website that EU citizens can access, GDPR may apply to you.</a:t>
+            </a:r>
+          </a:p>
+        </p:txBody>
+      </p:sp>
+      <p:sp>
+        <p:nvSpPr>
+          <p:cNvPr id="4" name="Slide Number Placeholder 3"/>
+          <p:cNvSpPr>
+            <a:spLocks noGrp="1"/>
+          </p:cNvSpPr>
+          <p:nvPr>
+            <p:ph type="sldNum" sz="quarter" idx="5"/>
+          </p:nvPr>
+        </p:nvSpPr>
+        <p:spPr/>
+      </p:sp>
+    </p:spTree>
+  </p:cSld>
+  <p:clrMapOvr>
+    <a:masterClrMapping/>
+  </p:clrMapOvr>
+</p:notes>
+</file>
+
+<file path=ppt/notesSlides/notesSlide33.xml><?xml version="1.0" encoding="utf-8"?>
+<p:notes xmlns:a="http://schemas.openxmlformats.org/drawingml/2006/main" xmlns:r="http://schemas.openxmlformats.org/officeDocument/2006/relationships" xmlns:p="http://schemas.openxmlformats.org/presentationml/2006/main">
+  <p:cSld>
+    <p:spTree>
+      <p:nvGrpSpPr>
+        <p:cNvPr id="1" name=""/>
+        <p:cNvGrpSpPr/>
+        <p:nvPr/>
+      </p:nvGrpSpPr>
+      <p:grpSpPr>
+        <a:xfrm>
+          <a:off x="0" y="0"/>
+          <a:ext cx="0" cy="0"/>
+          <a:chOff x="0" y="0"/>
+          <a:chExt cx="0" cy="0"/>
+        </a:xfrm>
+      </p:grpSpPr>
+      <p:sp>
+        <p:nvSpPr>
+          <p:cNvPr id="2" name="Slide Image Placeholder 1"/>
+          <p:cNvSpPr>
+            <a:spLocks noGrp="1" noRot="1" noChangeAspect="1"/>
+          </p:cNvSpPr>
+          <p:nvPr>
+            <p:ph type="sldImg" idx="2"/>
+          </p:nvPr>
+        </p:nvSpPr>
+        <p:spPr/>
+      </p:sp>
+      <p:sp>
+        <p:nvSpPr>
+          <p:cNvPr id="3" name="Notes Placeholder 2"/>
+          <p:cNvSpPr>
+            <a:spLocks noGrp="1"/>
+          </p:cNvSpPr>
+          <p:nvPr>
+            <p:ph type="body" sz="quarter" idx="3"/>
+          </p:nvPr>
+        </p:nvSpPr>
+        <p:spPr/>
+        <p:txBody>
+          <a:bodyPr/>
+          <a:lstStyle/>
+          <a:p>
+            <a:r>
+              <a:t>What to say: "'Right to be forgotten' is controversial. Google must remove search results in EU if requested (with exceptions). Doesn't apply in US - First Amendment conflict."</a:t>
+            </a:r>
+          </a:p>
+          <a:p>
+            <a:r>
+              <a:t>URL: https://transparencyreport.google.com/eu-privacy/overview - Google's transparency report on GDPR requests</a:t>
+            </a:r>
+          </a:p>
+        </p:txBody>
+      </p:sp>
+      <p:sp>
+        <p:nvSpPr>
+          <p:cNvPr id="4" name="Slide Number Placeholder 3"/>
+          <p:cNvSpPr>
+            <a:spLocks noGrp="1"/>
+          </p:cNvSpPr>
+          <p:nvPr>
+            <p:ph type="sldNum" sz="quarter" idx="5"/>
+          </p:nvPr>
+        </p:nvSpPr>
+        <p:spPr/>
+      </p:sp>
+    </p:spTree>
+  </p:cSld>
+  <p:clrMapOvr>
+    <a:masterClrMapping/>
+  </p:clrMapOvr>
+</p:notes>
+</file>
+
+<file path=ppt/notesSlides/notesSlide34.xml><?xml version="1.0" encoding="utf-8"?>
+<p:notes xmlns:a="http://schemas.openxmlformats.org/drawingml/2006/main" xmlns:r="http://schemas.openxmlformats.org/officeDocument/2006/relationships" xmlns:p="http://schemas.openxmlformats.org/presentationml/2006/main">
+  <p:cSld>
+    <p:spTree>
+      <p:nvGrpSpPr>
+        <p:cNvPr id="1" name=""/>
+        <p:cNvGrpSpPr/>
+        <p:nvPr/>
+      </p:nvGrpSpPr>
+      <p:grpSpPr>
+        <a:xfrm>
+          <a:off x="0" y="0"/>
+          <a:ext cx="0" cy="0"/>
+          <a:chOff x="0" y="0"/>
+          <a:chExt cx="0" cy="0"/>
+        </a:xfrm>
+      </p:grpSpPr>
+      <p:sp>
+        <p:nvSpPr>
+          <p:cNvPr id="2" name="Slide Image Placeholder 1"/>
+          <p:cNvSpPr>
+            <a:spLocks noGrp="1" noRot="1" noChangeAspect="1"/>
+          </p:cNvSpPr>
+          <p:nvPr>
+            <p:ph type="sldImg" idx="2"/>
+          </p:nvPr>
+        </p:nvSpPr>
+        <p:spPr/>
+      </p:sp>
+      <p:sp>
+        <p:nvSpPr>
+          <p:cNvPr id="3" name="Notes Placeholder 2"/>
+          <p:cNvSpPr>
+            <a:spLocks noGrp="1"/>
+          </p:cNvSpPr>
+          <p:nvPr>
+            <p:ph type="body" sz="quarter" idx="3"/>
+          </p:nvPr>
+        </p:nvSpPr>
+        <p:spPr/>
+        <p:txBody>
+          <a:bodyPr/>
+          <a:lstStyle/>
+          <a:p>
+            <a:r>
+              <a:t>What to say: "Cross-border transfers are complicated. EU says US doesn't have 'adequate' privacy protection. Privacy Shield was invalidated in 2020 (Schrems II). New framework in 2023, but legal challenges continue."</a:t>
+            </a:r>
+          </a:p>
+          <a:p>
+            <a:r>
+              <a:t>URL: https://www.dataprivacyframework.gov/ - New EU-US Data Privacy Framework</a:t>
+            </a:r>
+          </a:p>
+        </p:txBody>
+      </p:sp>
+      <p:sp>
+        <p:nvSpPr>
+          <p:cNvPr id="4" name="Slide Number Placeholder 3"/>
+          <p:cNvSpPr>
+            <a:spLocks noGrp="1"/>
+          </p:cNvSpPr>
+          <p:nvPr>
+            <p:ph type="sldNum" sz="quarter" idx="5"/>
+          </p:nvPr>
+        </p:nvSpPr>
+        <p:spPr/>
+      </p:sp>
+    </p:spTree>
+  </p:cSld>
+  <p:clrMapOvr>
+    <a:masterClrMapping/>
+  </p:clrMapOvr>
+</p:notes>
+</file>
+
+<file path=ppt/notesSlides/notesSlide35.xml><?xml version="1.0" encoding="utf-8"?>
+<p:notes xmlns:a="http://schemas.openxmlformats.org/drawingml/2006/main" xmlns:r="http://schemas.openxmlformats.org/officeDocument/2006/relationships" xmlns:p="http://schemas.openxmlformats.org/presentationml/2006/main">
+  <p:cSld>
+    <p:spTree>
+      <p:nvGrpSpPr>
+        <p:cNvPr id="1" name=""/>
+        <p:cNvGrpSpPr/>
+        <p:nvPr/>
+      </p:nvGrpSpPr>
+      <p:grpSpPr>
+        <a:xfrm>
+          <a:off x="0" y="0"/>
+          <a:ext cx="0" cy="0"/>
+          <a:chOff x="0" y="0"/>
+          <a:chExt cx="0" cy="0"/>
+        </a:xfrm>
+      </p:grpSpPr>
+      <p:sp>
+        <p:nvSpPr>
+          <p:cNvPr id="2" name="Slide Image Placeholder 1"/>
+          <p:cNvSpPr>
+            <a:spLocks noGrp="1" noRot="1" noChangeAspect="1"/>
+          </p:cNvSpPr>
+          <p:nvPr>
+            <p:ph type="sldImg" idx="2"/>
+          </p:nvPr>
+        </p:nvSpPr>
+        <p:spPr/>
+      </p:sp>
+      <p:sp>
+        <p:nvSpPr>
+          <p:cNvPr id="3" name="Notes Placeholder 2"/>
+          <p:cNvSpPr>
+            <a:spLocks noGrp="1"/>
+          </p:cNvSpPr>
+          <p:nvPr>
+            <p:ph type="body" sz="quarter" idx="3"/>
+          </p:nvPr>
+        </p:nvSpPr>
+        <p:spPr/>
+        <p:txBody>
+          <a:bodyPr/>
+          <a:lstStyle/>
+          <a:p>
+            <a:r>
+              <a:t>Context: GDPR enforcement examples</a:t>
+            </a:r>
+          </a:p>
+          <a:p>
+            <a:r>
+              <a:t>What to show: https://www.enforcementtracker.com/ - Live GDPR fines tracker</a:t>
+            </a:r>
+          </a:p>
+          <a:p>
+            <a:r>
+              <a:t>Examples: Meta €1.2B (2023), Amazon €746M (2021), Google €90M (2021)</a:t>
+            </a:r>
+          </a:p>
+        </p:txBody>
+      </p:sp>
+      <p:sp>
+        <p:nvSpPr>
+          <p:cNvPr id="4" name="Slide Number Placeholder 3"/>
+          <p:cNvSpPr>
+            <a:spLocks noGrp="1"/>
+          </p:cNvSpPr>
+          <p:nvPr>
+            <p:ph type="sldNum" sz="quarter" idx="5"/>
+          </p:nvPr>
+        </p:nvSpPr>
+        <p:spPr/>
+      </p:sp>
+    </p:spTree>
+  </p:cSld>
+  <p:clrMapOvr>
+    <a:masterClrMapping/>
+  </p:clrMapOvr>
+</p:notes>
+</file>
+
+<file path=ppt/notesSlides/notesSlide36.xml><?xml version="1.0" encoding="utf-8"?>
+<p:notes xmlns:a="http://schemas.openxmlformats.org/drawingml/2006/main" xmlns:r="http://schemas.openxmlformats.org/officeDocument/2006/relationships" xmlns:p="http://schemas.openxmlformats.org/presentationml/2006/main">
+  <p:cSld>
+    <p:spTree>
+      <p:nvGrpSpPr>
+        <p:cNvPr id="1" name=""/>
+        <p:cNvGrpSpPr/>
+        <p:nvPr/>
+      </p:nvGrpSpPr>
+      <p:grpSpPr>
+        <a:xfrm>
+          <a:off x="0" y="0"/>
+          <a:ext cx="0" cy="0"/>
+          <a:chOff x="0" y="0"/>
+          <a:chExt cx="0" cy="0"/>
+        </a:xfrm>
+      </p:grpSpPr>
+      <p:sp>
+        <p:nvSpPr>
+          <p:cNvPr id="2" name="Slide Image Placeholder 1"/>
+          <p:cNvSpPr>
+            <a:spLocks noGrp="1" noRot="1" noChangeAspect="1"/>
+          </p:cNvSpPr>
+          <p:nvPr>
+            <p:ph type="sldImg" idx="2"/>
+          </p:nvPr>
+        </p:nvSpPr>
+        <p:spPr/>
+      </p:sp>
+      <p:sp>
+        <p:nvSpPr>
+          <p:cNvPr id="3" name="Notes Placeholder 2"/>
+          <p:cNvSpPr>
+            <a:spLocks noGrp="1"/>
+          </p:cNvSpPr>
+          <p:nvPr>
+            <p:ph type="body" sz="quarter" idx="3"/>
+          </p:nvPr>
+        </p:nvSpPr>
+        <p:spPr/>
+        <p:txBody>
+          <a:bodyPr/>
+          <a:lstStyle/>
+          <a:p>
+            <a:r>
+              <a:t>What to say: "Debate: Does GDPR protect privacy or just make compliance so expensive that only big tech can afford it? Small startups struggle with compliance. Cookie consent is annoying UX. But enforcement is real."</a:t>
+            </a:r>
+          </a:p>
+          <a:p>
+            <a:r>
+              <a:t>Counterpoint: GDPR hasn't stopped big tech dominance</a:t>
+            </a:r>
+          </a:p>
+        </p:txBody>
+      </p:sp>
+      <p:sp>
+        <p:nvSpPr>
+          <p:cNvPr id="4" name="Slide Number Placeholder 3"/>
+          <p:cNvSpPr>
+            <a:spLocks noGrp="1"/>
+          </p:cNvSpPr>
+          <p:nvPr>
+            <p:ph type="sldNum" sz="quarter" idx="5"/>
+          </p:nvPr>
+        </p:nvSpPr>
+        <p:spPr/>
+      </p:sp>
+    </p:spTree>
+  </p:cSld>
+  <p:clrMapOvr>
+    <a:masterClrMapping/>
+  </p:clrMapOvr>
+</p:notes>
+</file>
+
+<file path=ppt/notesSlides/notesSlide37.xml><?xml version="1.0" encoding="utf-8"?>
+<p:notes xmlns:a="http://schemas.openxmlformats.org/drawingml/2006/main" xmlns:r="http://schemas.openxmlformats.org/officeDocument/2006/relationships" xmlns:p="http://schemas.openxmlformats.org/presentationml/2006/main">
+  <p:cSld>
+    <p:spTree>
+      <p:nvGrpSpPr>
+        <p:cNvPr id="1" name=""/>
+        <p:cNvGrpSpPr/>
+        <p:nvPr/>
+      </p:nvGrpSpPr>
+      <p:grpSpPr>
+        <a:xfrm>
+          <a:off x="0" y="0"/>
+          <a:ext cx="0" cy="0"/>
+          <a:chOff x="0" y="0"/>
+          <a:chExt cx="0" cy="0"/>
+        </a:xfrm>
+      </p:grpSpPr>
+      <p:sp>
+        <p:nvSpPr>
+          <p:cNvPr id="2" name="Slide Image Placeholder 1"/>
+          <p:cNvSpPr>
+            <a:spLocks noGrp="1" noRot="1" noChangeAspect="1"/>
+          </p:cNvSpPr>
+          <p:nvPr>
+            <p:ph type="sldImg"/>
+          </p:nvPr>
+        </p:nvSpPr>
+        <p:spPr/>
+      </p:sp>
+      <p:sp>
+        <p:nvSpPr>
+          <p:cNvPr id="3" name="Notes Placeholder 2"/>
+          <p:cNvSpPr>
+            <a:spLocks noGrp="1"/>
+          </p:cNvSpPr>
+          <p:nvPr>
+            <p:ph type="body" idx="1"/>
+          </p:nvPr>
+        </p:nvSpPr>
+        <p:spPr/>
+        <p:txBody>
+          <a:bodyPr/>
+          <a:lstStyle/>
+          <a:p>
+            <a:r>
+              <a:t>URLs to show:</a:t>
+            </a:r>
+          </a:p>
+          <a:p>
+            <a:r>
+              <a:t>- TikTok: https://www.nytimes.com/2024/01/29/technology/tiktok-data-privacy-lawsuit.html</a:t>
+            </a:r>
+          </a:p>
+          <a:p>
+            <a:r>
+              <a:t>- Cars selling data: https://foundation.mozilla.org/en/privacynotincluded/categories/cars/</a:t>
+            </a:r>
+          </a:p>
+          <a:p>
+            <a:r>
+              <a:t>- GoodRx: https://www.ftc.gov/news-events/news/press-releases/2023/02/ftc-enforcement-action-bar-goodrx-sharing-consumers-sensitive-health-info-advertising</a:t>
+            </a:r>
+          </a:p>
+          <a:p>
+            <a:r>
+              <a:t>- Twitter 2FA: https://www.ftc.gov/news-events/news/press-releases/2022/05/ftc-charges-twitter-deceptively-using-account-security-data-sell-targeted-ads</a:t>
+            </a:r>
+          </a:p>
+        </p:txBody>
+      </p:sp>
+      <p:sp>
+        <p:nvSpPr>
+          <p:cNvPr id="4" name="Slide Number Placeholder 3"/>
+          <p:cNvSpPr>
+            <a:spLocks noGrp="1"/>
+          </p:cNvSpPr>
+          <p:nvPr>
+            <p:ph type="sldNum" sz="quarter" idx="5"/>
+          </p:nvPr>
+        </p:nvSpPr>
+        <p:spPr/>
+        <p:txBody>
+          <a:bodyPr/>
+          <a:lstStyle/>
+          <a:p>
+            <a:fld id="{19237381-9D2A-0D46-A31D-B9FCFAE45650}" type="slidenum">
+              <a:rPr lang="en-US" smtClean="0"/>
+              <a:t>42</a:t>
+            </a:fld>
+            <a:endParaRPr lang="en-US"/>
+          </a:p>
+        </p:txBody>
+      </p:sp>
+    </p:spTree>
+    <p:extLst>
+      <p:ext uri="{BB962C8B-B14F-4D97-AF65-F5344CB8AC3E}">
+        <p14:creationId xmlns:p14="http://schemas.microsoft.com/office/powerpoint/2010/main" val="1168318316"/>
       </p:ext>
     </p:extLst>
   </p:cSld>
@@ -1019,7 +2990,7 @@
             <a:spLocks noGrp="1" noRot="1" noChangeAspect="1"/>
           </p:cNvSpPr>
           <p:nvPr>
-            <p:ph type="sldImg"/>
+            <p:ph type="sldImg" idx="2"/>
           </p:nvPr>
         </p:nvSpPr>
         <p:spPr/>
@@ -1031,15 +3002,22 @@
             <a:spLocks noGrp="1"/>
           </p:cNvSpPr>
           <p:nvPr>
-            <p:ph type="body" idx="1"/>
-          </p:nvPr>
-        </p:nvSpPr>
-        <p:spPr/>
-        <p:txBody>
-          <a:bodyPr/>
-          <a:lstStyle/>
-          <a:p>
-            <a:endParaRPr lang="en-US" dirty="0"/>
+            <p:ph type="body" sz="quarter" idx="3"/>
+          </p:nvPr>
+        </p:nvSpPr>
+        <p:spPr/>
+        <p:txBody>
+          <a:bodyPr/>
+          <a:lstStyle/>
+          <a:p>
+            <a:r>
+              <a:t>Context: 1973 HEW report</a:t>
+            </a:r>
+          </a:p>
+          <a:p>
+            <a:r>
+              <a:t>What to say: "These principles became the foundation for most privacy law worldwide. Notice the focus on transparency and individual control - we'll come back to whether this model still works." </a:t>
+            </a:r>
           </a:p>
         </p:txBody>
       </p:sp>
@@ -1050,28 +3028,12 @@
             <a:spLocks noGrp="1"/>
           </p:cNvSpPr>
           <p:nvPr>
-            <p:ph type="sldNum" sz="quarter" idx="10"/>
-          </p:nvPr>
-        </p:nvSpPr>
-        <p:spPr/>
-        <p:txBody>
-          <a:bodyPr/>
-          <a:lstStyle/>
-          <a:p>
-            <a:fld id="{60EA165A-C3FE-834A-926F-47D8C9BA346E}" type="slidenum">
-              <a:rPr lang="en-US" smtClean="0"/>
-              <a:t>16</a:t>
-            </a:fld>
-            <a:endParaRPr lang="en-US"/>
-          </a:p>
-        </p:txBody>
+            <p:ph type="sldNum" sz="quarter" idx="5"/>
+          </p:nvPr>
+        </p:nvSpPr>
+        <p:spPr/>
       </p:sp>
     </p:spTree>
-    <p:extLst>
-      <p:ext uri="{BB962C8B-B14F-4D97-AF65-F5344CB8AC3E}">
-        <p14:creationId xmlns:p14="http://schemas.microsoft.com/office/powerpoint/2010/main" val="1470667941"/>
-      </p:ext>
-    </p:extLst>
   </p:cSld>
   <p:clrMapOvr>
     <a:masterClrMapping/>
@@ -1103,7 +3065,7 @@
             <a:spLocks noGrp="1" noRot="1" noChangeAspect="1"/>
           </p:cNvSpPr>
           <p:nvPr>
-            <p:ph type="sldImg"/>
+            <p:ph type="sldImg" idx="2"/>
           </p:nvPr>
         </p:nvSpPr>
         <p:spPr/>
@@ -1115,15 +3077,22 @@
             <a:spLocks noGrp="1"/>
           </p:cNvSpPr>
           <p:nvPr>
-            <p:ph type="body" idx="1"/>
-          </p:nvPr>
-        </p:nvSpPr>
-        <p:spPr/>
-        <p:txBody>
-          <a:bodyPr/>
-          <a:lstStyle/>
-          <a:p>
-            <a:endParaRPr lang="en-US" dirty="0"/>
+            <p:ph type="body" sz="quarter" idx="3"/>
+          </p:nvPr>
+        </p:nvSpPr>
+        <p:spPr/>
+        <p:txBody>
+          <a:bodyPr/>
+          <a:lstStyle/>
+          <a:p>
+            <a:r>
+              <a:t>What to say: "This is why every website has a privacy policy. Problem: they're unreadable. Instagram's is 10,000+ words. The notice-and-consent model is fundamentally broken."</a:t>
+            </a:r>
+          </a:p>
+          <a:p>
+            <a:r>
+              <a:t>URL to demo: https://tosdr.org/ - "Terms of Service; Didn't Read" rates privacy policies</a:t>
+            </a:r>
           </a:p>
         </p:txBody>
       </p:sp>
@@ -1138,24 +3107,8 @@
           </p:nvPr>
         </p:nvSpPr>
         <p:spPr/>
-        <p:txBody>
-          <a:bodyPr/>
-          <a:lstStyle/>
-          <a:p>
-            <a:fld id="{19237381-9D2A-0D46-A31D-B9FCFAE45650}" type="slidenum">
-              <a:rPr lang="en-US" smtClean="0"/>
-              <a:t>20</a:t>
-            </a:fld>
-            <a:endParaRPr lang="en-US"/>
-          </a:p>
-        </p:txBody>
       </p:sp>
     </p:spTree>
-    <p:extLst>
-      <p:ext uri="{BB962C8B-B14F-4D97-AF65-F5344CB8AC3E}">
-        <p14:creationId xmlns:p14="http://schemas.microsoft.com/office/powerpoint/2010/main" val="3598152422"/>
-      </p:ext>
-    </p:extLst>
   </p:cSld>
   <p:clrMapOvr>
     <a:masterClrMapping/>
@@ -1187,7 +3140,7 @@
             <a:spLocks noGrp="1" noRot="1" noChangeAspect="1"/>
           </p:cNvSpPr>
           <p:nvPr>
-            <p:ph type="sldImg"/>
+            <p:ph type="sldImg" idx="2"/>
           </p:nvPr>
         </p:nvSpPr>
         <p:spPr/>
@@ -1199,15 +3152,22 @@
             <a:spLocks noGrp="1"/>
           </p:cNvSpPr>
           <p:nvPr>
-            <p:ph type="body" idx="1"/>
-          </p:nvPr>
-        </p:nvSpPr>
-        <p:spPr/>
-        <p:txBody>
-          <a:bodyPr/>
-          <a:lstStyle/>
-          <a:p>
-            <a:endParaRPr lang="en-US" dirty="0"/>
+            <p:ph type="body" sz="quarter" idx="3"/>
+          </p:nvPr>
+        </p:nvSpPr>
+        <p:spPr/>
+        <p:txBody>
+          <a:bodyPr/>
+          <a:lstStyle/>
+          <a:p>
+            <a:r>
+              <a:t>What to say: "Primary use: obvious. Secondary uses: contentious. When is it OK to use data for purposes beyond what it was collected for?"</a:t>
+            </a:r>
+          </a:p>
+          <a:p>
+            <a:r>
+              <a:t>Example: Target figured out a teen was pregnant before her father knew, based on purchasing patterns. Appropriate use of data?</a:t>
+            </a:r>
           </a:p>
         </p:txBody>
       </p:sp>
@@ -1222,24 +3182,8 @@
           </p:nvPr>
         </p:nvSpPr>
         <p:spPr/>
-        <p:txBody>
-          <a:bodyPr/>
-          <a:lstStyle/>
-          <a:p>
-            <a:fld id="{19237381-9D2A-0D46-A31D-B9FCFAE45650}" type="slidenum">
-              <a:rPr lang="en-US" smtClean="0"/>
-              <a:t>31</a:t>
-            </a:fld>
-            <a:endParaRPr lang="en-US"/>
-          </a:p>
-        </p:txBody>
       </p:sp>
     </p:spTree>
-    <p:extLst>
-      <p:ext uri="{BB962C8B-B14F-4D97-AF65-F5344CB8AC3E}">
-        <p14:creationId xmlns:p14="http://schemas.microsoft.com/office/powerpoint/2010/main" val="2369549844"/>
-      </p:ext>
-    </p:extLst>
   </p:cSld>
   <p:clrMapOvr>
     <a:masterClrMapping/>
@@ -1271,7 +3215,7 @@
             <a:spLocks noGrp="1" noRot="1" noChangeAspect="1"/>
           </p:cNvSpPr>
           <p:nvPr>
-            <p:ph type="sldImg"/>
+            <p:ph type="sldImg" idx="2"/>
           </p:nvPr>
         </p:nvSpPr>
         <p:spPr/>
@@ -1283,121 +3227,17 @@
             <a:spLocks noGrp="1"/>
           </p:cNvSpPr>
           <p:nvPr>
-            <p:ph type="body" idx="1"/>
-          </p:nvPr>
-        </p:nvSpPr>
-        <p:spPr/>
-        <p:txBody>
-          <a:bodyPr/>
-          <a:lstStyle/>
-          <a:p>
-            <a:r>
-              <a:rPr lang="en-US" sz="1200" b="0" i="0" kern="1200" dirty="0">
-                <a:solidFill>
-                  <a:schemeClr val="tx1"/>
-                </a:solidFill>
-                <a:effectLst/>
-                <a:latin typeface="+mn-lt"/>
-                <a:ea typeface="+mn-ea"/>
-                <a:cs typeface="+mn-cs"/>
-              </a:rPr>
-              <a:t>The FTC is currently investigating to answer this question. But many experts, including former FTC officials, say it looks like it has. David Vladeck, the former director of the FTC's Bureau of Consumer Protection, who worked on the </a:t>
-            </a:r>
-            <a:r>
-              <a:rPr lang="en-US" sz="1200" b="0" i="0" kern="1200" dirty="0">
-                <a:solidFill>
-                  <a:schemeClr val="tx1"/>
-                </a:solidFill>
-                <a:effectLst/>
-                <a:latin typeface="+mn-lt"/>
-                <a:ea typeface="+mn-ea"/>
-                <a:cs typeface="+mn-cs"/>
-                <a:hlinkClick r:id="rId3"/>
-              </a:rPr>
-              <a:t>FTC's enforcement case against Facebook</a:t>
-            </a:r>
-            <a:r>
-              <a:rPr lang="en-US" sz="1200" b="0" i="0" kern="1200" dirty="0">
-                <a:solidFill>
-                  <a:schemeClr val="tx1"/>
-                </a:solidFill>
-                <a:effectLst/>
-                <a:latin typeface="+mn-lt"/>
-                <a:ea typeface="+mn-ea"/>
-                <a:cs typeface="+mn-cs"/>
-              </a:rPr>
-              <a:t>, writes in a Harvard Law Review blog "Facebook's apparent violations … of the decree is troubling." He suggested that even aside from the consent decree, the way Facebook allowed Kogan to harvest user data "plainly violated the Federal Trade Commission Act's </a:t>
-            </a:r>
-            <a:r>
-              <a:rPr lang="en-US" sz="1200" b="0" i="0" kern="1200" dirty="0">
-                <a:solidFill>
-                  <a:schemeClr val="tx1"/>
-                </a:solidFill>
-                <a:effectLst/>
-                <a:latin typeface="+mn-lt"/>
-                <a:ea typeface="+mn-ea"/>
-                <a:cs typeface="+mn-cs"/>
-                <a:hlinkClick r:id="rId4"/>
-              </a:rPr>
-              <a:t>prohibition</a:t>
-            </a:r>
-            <a:r>
-              <a:rPr lang="en-US" sz="1200" b="0" i="0" kern="1200" dirty="0">
-                <a:solidFill>
-                  <a:schemeClr val="tx1"/>
-                </a:solidFill>
-                <a:effectLst/>
-                <a:latin typeface="+mn-lt"/>
-                <a:ea typeface="+mn-ea"/>
-                <a:cs typeface="+mn-cs"/>
-              </a:rPr>
-              <a:t> against 'deceptive acts or practices.'"</a:t>
-            </a:r>
-          </a:p>
-          <a:p>
-            <a:r>
-              <a:rPr lang="en-US" sz="1200" b="0" i="0" kern="1200" dirty="0">
-                <a:solidFill>
-                  <a:schemeClr val="tx1"/>
-                </a:solidFill>
-                <a:effectLst/>
-                <a:latin typeface="+mn-lt"/>
-                <a:ea typeface="+mn-ea"/>
-                <a:cs typeface="+mn-cs"/>
-              </a:rPr>
-              <a:t>And then there's the questions of the third-party audits that Facebook was supposed to be doing in order to verify it was protecting user data.</a:t>
-            </a:r>
-          </a:p>
-          <a:p>
-            <a:r>
-              <a:rPr lang="en-US" sz="1200" b="0" i="0" kern="1200" dirty="0">
-                <a:solidFill>
-                  <a:schemeClr val="tx1"/>
-                </a:solidFill>
-                <a:effectLst/>
-                <a:latin typeface="+mn-lt"/>
-                <a:ea typeface="+mn-ea"/>
-                <a:cs typeface="+mn-cs"/>
-              </a:rPr>
-              <a:t>Zuckerberg explained during the hearing that when Facebook discovered Kogan had sold the data to Cambridge Analytica, the company asked the firm to delete the information. But Facebook didn't verify that it had actually done that. The company also didn't notify users that their data had been shared without their permission. Vladeck said that's a blatant violation of the consent decree.</a:t>
-            </a:r>
-          </a:p>
-          <a:p>
-            <a:r>
-              <a:rPr lang="en-US" sz="1200" b="0" i="0" kern="1200" dirty="0">
-                <a:solidFill>
-                  <a:schemeClr val="tx1"/>
-                </a:solidFill>
-                <a:effectLst/>
-                <a:latin typeface="+mn-lt"/>
-                <a:ea typeface="+mn-ea"/>
-                <a:cs typeface="+mn-cs"/>
-              </a:rPr>
-              <a:t>"It doesn't appear that Facebook had even the most basic compliance framework to safeguard access to user data," he said in his blog post. "It is entirely predictable that if app developers are not held to their promises about data collection and sharing, they might not be candid with Facebook about their intentions. Yet it seems that Facebook made no effort to establish the bona fides of developers, much less verify or audit what user data app developers actually harvested and shared."</a:t>
-            </a:r>
-          </a:p>
-          <a:p>
-            <a:endParaRPr lang="en-US" dirty="0"/>
+            <p:ph type="body" sz="quarter" idx="3"/>
+          </p:nvPr>
+        </p:nvSpPr>
+        <p:spPr/>
+        <p:txBody>
+          <a:bodyPr/>
+          <a:lstStyle/>
+          <a:p>
+            <a:r>
+              <a:t>What to say: "Classic secondary use debate. Collected for employment, used for law enforcement. Most people think this is reasonable. But where's the line?" </a:t>
+            </a:r>
           </a:p>
         </p:txBody>
       </p:sp>
@@ -1412,24 +3252,8 @@
           </p:nvPr>
         </p:nvSpPr>
         <p:spPr/>
-        <p:txBody>
-          <a:bodyPr/>
-          <a:lstStyle/>
-          <a:p>
-            <a:fld id="{19237381-9D2A-0D46-A31D-B9FCFAE45650}" type="slidenum">
-              <a:rPr lang="en-US" smtClean="0"/>
-              <a:t>33</a:t>
-            </a:fld>
-            <a:endParaRPr lang="en-US"/>
-          </a:p>
-        </p:txBody>
       </p:sp>
     </p:spTree>
-    <p:extLst>
-      <p:ext uri="{BB962C8B-B14F-4D97-AF65-F5344CB8AC3E}">
-        <p14:creationId xmlns:p14="http://schemas.microsoft.com/office/powerpoint/2010/main" val="3669808676"/>
-      </p:ext>
-    </p:extLst>
   </p:cSld>
   <p:clrMapOvr>
     <a:masterClrMapping/>
@@ -1461,7 +3285,7 @@
             <a:spLocks noGrp="1" noRot="1" noChangeAspect="1"/>
           </p:cNvSpPr>
           <p:nvPr>
-            <p:ph type="sldImg"/>
+            <p:ph type="sldImg" idx="2"/>
           </p:nvPr>
         </p:nvSpPr>
         <p:spPr/>
@@ -1473,15 +3297,22 @@
             <a:spLocks noGrp="1"/>
           </p:cNvSpPr>
           <p:nvPr>
-            <p:ph type="body" idx="1"/>
-          </p:nvPr>
-        </p:nvSpPr>
-        <p:spPr/>
-        <p:txBody>
-          <a:bodyPr/>
-          <a:lstStyle/>
-          <a:p>
-            <a:endParaRPr lang="en-US" dirty="0"/>
+            <p:ph type="body" sz="quarter" idx="3"/>
+          </p:nvPr>
+        </p:nvSpPr>
+        <p:spPr/>
+        <p:txBody>
+          <a:bodyPr/>
+          <a:lstStyle/>
+          <a:p>
+            <a:r>
+              <a:t>What to say: "GDPR requires opt-in for most things. US typically allows opt-out. Huge difference in practice - opt-out means most people never opt out."</a:t>
+            </a:r>
+          </a:p>
+          <a:p>
+            <a:r>
+              <a:t>Demo: Show annoying cookie consent banners on EU sites vs. US sites with no banners</a:t>
+            </a:r>
           </a:p>
         </p:txBody>
       </p:sp>
@@ -1496,24 +3327,83 @@
           </p:nvPr>
         </p:nvSpPr>
         <p:spPr/>
-        <p:txBody>
-          <a:bodyPr/>
-          <a:lstStyle/>
-          <a:p>
-            <a:fld id="{19237381-9D2A-0D46-A31D-B9FCFAE45650}" type="slidenum">
-              <a:rPr lang="en-US" smtClean="0"/>
-              <a:t>42</a:t>
-            </a:fld>
-            <a:endParaRPr lang="en-US"/>
-          </a:p>
-        </p:txBody>
       </p:sp>
     </p:spTree>
-    <p:extLst>
-      <p:ext uri="{BB962C8B-B14F-4D97-AF65-F5344CB8AC3E}">
-        <p14:creationId xmlns:p14="http://schemas.microsoft.com/office/powerpoint/2010/main" val="1168318316"/>
-      </p:ext>
-    </p:extLst>
+  </p:cSld>
+  <p:clrMapOvr>
+    <a:masterClrMapping/>
+  </p:clrMapOvr>
+</p:notes>
+</file>
+
+<file path=ppt/notesSlides/notesSlide9.xml><?xml version="1.0" encoding="utf-8"?>
+<p:notes xmlns:a="http://schemas.openxmlformats.org/drawingml/2006/main" xmlns:r="http://schemas.openxmlformats.org/officeDocument/2006/relationships" xmlns:p="http://schemas.openxmlformats.org/presentationml/2006/main">
+  <p:cSld>
+    <p:spTree>
+      <p:nvGrpSpPr>
+        <p:cNvPr id="1" name=""/>
+        <p:cNvGrpSpPr/>
+        <p:nvPr/>
+      </p:nvGrpSpPr>
+      <p:grpSpPr>
+        <a:xfrm>
+          <a:off x="0" y="0"/>
+          <a:ext cx="0" cy="0"/>
+          <a:chOff x="0" y="0"/>
+          <a:chExt cx="0" cy="0"/>
+        </a:xfrm>
+      </p:grpSpPr>
+      <p:sp>
+        <p:nvSpPr>
+          <p:cNvPr id="2" name="Slide Image Placeholder 1"/>
+          <p:cNvSpPr>
+            <a:spLocks noGrp="1" noRot="1" noChangeAspect="1"/>
+          </p:cNvSpPr>
+          <p:nvPr>
+            <p:ph type="sldImg" idx="2"/>
+          </p:nvPr>
+        </p:nvSpPr>
+        <p:spPr/>
+      </p:sp>
+      <p:sp>
+        <p:nvSpPr>
+          <p:cNvPr id="3" name="Notes Placeholder 2"/>
+          <p:cNvSpPr>
+            <a:spLocks noGrp="1"/>
+          </p:cNvSpPr>
+          <p:nvPr>
+            <p:ph type="body" sz="quarter" idx="3"/>
+          </p:nvPr>
+        </p:nvSpPr>
+        <p:spPr/>
+        <p:txBody>
+          <a:bodyPr/>
+          <a:lstStyle/>
+          <a:p>
+            <a:r>
+              <a:t>What to say: "GDPR's 'Right to Access' is powerful - you can request all data a company has on you. Try it with Google or Facebook - you'll be shocked."</a:t>
+            </a:r>
+          </a:p>
+          <a:p>
+            <a:r>
+              <a:t>URL: https://support.google.com/accounts/answer/3024190 - How to download your Google data</a:t>
+            </a:r>
+          </a:p>
+        </p:txBody>
+      </p:sp>
+      <p:sp>
+        <p:nvSpPr>
+          <p:cNvPr id="4" name="Slide Number Placeholder 3"/>
+          <p:cNvSpPr>
+            <a:spLocks noGrp="1"/>
+          </p:cNvSpPr>
+          <p:nvPr>
+            <p:ph type="sldNum" sz="quarter" idx="5"/>
+          </p:nvPr>
+        </p:nvSpPr>
+        <p:spPr/>
+      </p:sp>
+    </p:spTree>
   </p:cSld>
   <p:clrMapOvr>
     <a:masterClrMapping/>
@@ -1668,7 +3558,7 @@
           <a:p>
             <a:fld id="{19A37E14-C902-8243-905A-238D1EC85CD8}" type="datetimeFigureOut">
               <a:rPr lang="en-US" smtClean="0"/>
-              <a:t>8/15/25</a:t>
+              <a:t>11/12/25</a:t>
             </a:fld>
             <a:endParaRPr lang="en-US"/>
           </a:p>
@@ -1866,7 +3756,7 @@
           <a:p>
             <a:fld id="{19A37E14-C902-8243-905A-238D1EC85CD8}" type="datetimeFigureOut">
               <a:rPr lang="en-US" smtClean="0"/>
-              <a:t>8/15/25</a:t>
+              <a:t>11/12/25</a:t>
             </a:fld>
             <a:endParaRPr lang="en-US"/>
           </a:p>
@@ -2074,7 +3964,7 @@
           <a:p>
             <a:fld id="{19A37E14-C902-8243-905A-238D1EC85CD8}" type="datetimeFigureOut">
               <a:rPr lang="en-US" smtClean="0"/>
-              <a:t>8/15/25</a:t>
+              <a:t>11/12/25</a:t>
             </a:fld>
             <a:endParaRPr lang="en-US"/>
           </a:p>
@@ -2272,7 +4162,7 @@
           <a:p>
             <a:fld id="{19A37E14-C902-8243-905A-238D1EC85CD8}" type="datetimeFigureOut">
               <a:rPr lang="en-US" smtClean="0"/>
-              <a:t>8/15/25</a:t>
+              <a:t>11/12/25</a:t>
             </a:fld>
             <a:endParaRPr lang="en-US"/>
           </a:p>
@@ -2547,7 +4437,7 @@
           <a:p>
             <a:fld id="{19A37E14-C902-8243-905A-238D1EC85CD8}" type="datetimeFigureOut">
               <a:rPr lang="en-US" smtClean="0"/>
-              <a:t>8/15/25</a:t>
+              <a:t>11/12/25</a:t>
             </a:fld>
             <a:endParaRPr lang="en-US"/>
           </a:p>
@@ -2812,7 +4702,7 @@
           <a:p>
             <a:fld id="{19A37E14-C902-8243-905A-238D1EC85CD8}" type="datetimeFigureOut">
               <a:rPr lang="en-US" smtClean="0"/>
-              <a:t>8/15/25</a:t>
+              <a:t>11/12/25</a:t>
             </a:fld>
             <a:endParaRPr lang="en-US"/>
           </a:p>
@@ -3224,7 +5114,7 @@
           <a:p>
             <a:fld id="{19A37E14-C902-8243-905A-238D1EC85CD8}" type="datetimeFigureOut">
               <a:rPr lang="en-US" smtClean="0"/>
-              <a:t>8/15/25</a:t>
+              <a:t>11/12/25</a:t>
             </a:fld>
             <a:endParaRPr lang="en-US"/>
           </a:p>
@@ -3365,7 +5255,7 @@
           <a:p>
             <a:fld id="{19A37E14-C902-8243-905A-238D1EC85CD8}" type="datetimeFigureOut">
               <a:rPr lang="en-US" smtClean="0"/>
-              <a:t>8/15/25</a:t>
+              <a:t>11/12/25</a:t>
             </a:fld>
             <a:endParaRPr lang="en-US"/>
           </a:p>
@@ -3478,7 +5368,7 @@
           <a:p>
             <a:fld id="{19A37E14-C902-8243-905A-238D1EC85CD8}" type="datetimeFigureOut">
               <a:rPr lang="en-US" smtClean="0"/>
-              <a:t>8/15/25</a:t>
+              <a:t>11/12/25</a:t>
             </a:fld>
             <a:endParaRPr lang="en-US"/>
           </a:p>
@@ -3789,7 +5679,7 @@
           <a:p>
             <a:fld id="{19A37E14-C902-8243-905A-238D1EC85CD8}" type="datetimeFigureOut">
               <a:rPr lang="en-US" smtClean="0"/>
-              <a:t>8/15/25</a:t>
+              <a:t>11/12/25</a:t>
             </a:fld>
             <a:endParaRPr lang="en-US"/>
           </a:p>
@@ -4077,7 +5967,7 @@
           <a:p>
             <a:fld id="{19A37E14-C902-8243-905A-238D1EC85CD8}" type="datetimeFigureOut">
               <a:rPr lang="en-US" smtClean="0"/>
-              <a:t>8/15/25</a:t>
+              <a:t>11/12/25</a:t>
             </a:fld>
             <a:endParaRPr lang="en-US"/>
           </a:p>
@@ -4318,7 +6208,7 @@
           <a:p>
             <a:fld id="{19A37E14-C902-8243-905A-238D1EC85CD8}" type="datetimeFigureOut">
               <a:rPr lang="en-US" smtClean="0"/>
-              <a:t>8/15/25</a:t>
+              <a:t>11/12/25</a:t>
             </a:fld>
             <a:endParaRPr lang="en-US"/>
           </a:p>
@@ -7145,7 +9035,7 @@
           <p:nvPr/>
         </p:nvPicPr>
         <p:blipFill>
-          <a:blip r:embed="rId2"/>
+          <a:blip r:embed="rId3"/>
           <a:stretch>
             <a:fillRect/>
           </a:stretch>
@@ -7236,7 +9126,7 @@
           <p:nvPr/>
         </p:nvPicPr>
         <p:blipFill>
-          <a:blip r:embed="rId3"/>
+          <a:blip r:embed="rId4"/>
           <a:stretch>
             <a:fillRect/>
           </a:stretch>
@@ -7266,7 +9156,7 @@
           <p:nvPr/>
         </p:nvPicPr>
         <p:blipFill>
-          <a:blip r:embed="rId4"/>
+          <a:blip r:embed="rId5"/>
           <a:stretch>
             <a:fillRect/>
           </a:stretch>
@@ -7826,7 +9716,7 @@
           <p:nvPr/>
         </p:nvPicPr>
         <p:blipFill>
-          <a:blip r:embed="rId2"/>
+          <a:blip r:embed="rId3"/>
           <a:stretch>
             <a:fillRect/>
           </a:stretch>
@@ -8268,7 +10158,7 @@
           <p:nvPr/>
         </p:nvPicPr>
         <p:blipFill>
-          <a:blip r:embed="rId2"/>
+          <a:blip r:embed="rId3"/>
           <a:stretch>
             <a:fillRect/>
           </a:stretch>
@@ -8363,7 +10253,7 @@
           <p:nvPr/>
         </p:nvPicPr>
         <p:blipFill>
-          <a:blip r:embed="rId2"/>
+          <a:blip r:embed="rId3"/>
           <a:stretch>
             <a:fillRect/>
           </a:stretch>
@@ -8883,7 +10773,7 @@
           <p:nvPr/>
         </p:nvPicPr>
         <p:blipFill>
-          <a:blip r:embed="rId2"/>
+          <a:blip r:embed="rId3"/>
           <a:stretch>
             <a:fillRect/>
           </a:stretch>
@@ -8913,7 +10803,7 @@
           <p:nvPr/>
         </p:nvPicPr>
         <p:blipFill>
-          <a:blip r:embed="rId3"/>
+          <a:blip r:embed="rId4"/>
           <a:stretch>
             <a:fillRect/>
           </a:stretch>
@@ -9107,7 +10997,7 @@
           <p:nvPr/>
         </p:nvPicPr>
         <p:blipFill>
-          <a:blip r:embed="rId2"/>
+          <a:blip r:embed="rId3"/>
           <a:stretch>
             <a:fillRect/>
           </a:stretch>
@@ -10464,7 +12354,7 @@
           <p:nvPr/>
         </p:nvPicPr>
         <p:blipFill>
-          <a:blip r:embed="rId2">
+          <a:blip r:embed="rId3">
             <a:extLst>
               <a:ext uri="{28A0092B-C50C-407E-A947-70E740481C1C}">
                 <a14:useLocalDpi xmlns:a14="http://schemas.microsoft.com/office/drawing/2010/main" val="0"/>
@@ -10530,7 +12420,7 @@
           <p:nvPr/>
         </p:nvPicPr>
         <p:blipFill>
-          <a:blip r:embed="rId2"/>
+          <a:blip r:embed="rId3"/>
           <a:stretch>
             <a:fillRect/>
           </a:stretch>
@@ -10560,7 +12450,7 @@
           <p:nvPr/>
         </p:nvPicPr>
         <p:blipFill>
-          <a:blip r:embed="rId3"/>
+          <a:blip r:embed="rId4"/>
           <a:stretch>
             <a:fillRect/>
           </a:stretch>
@@ -10590,7 +12480,7 @@
           <p:nvPr/>
         </p:nvPicPr>
         <p:blipFill>
-          <a:blip r:embed="rId4"/>
+          <a:blip r:embed="rId5"/>
           <a:stretch>
             <a:fillRect/>
           </a:stretch>
@@ -10685,7 +12575,7 @@
           <p:nvPr/>
         </p:nvPicPr>
         <p:blipFill>
-          <a:blip r:embed="rId2"/>
+          <a:blip r:embed="rId3"/>
           <a:stretch>
             <a:fillRect/>
           </a:stretch>
@@ -10715,7 +12605,7 @@
           <p:nvPr/>
         </p:nvPicPr>
         <p:blipFill>
-          <a:blip r:embed="rId3"/>
+          <a:blip r:embed="rId4"/>
           <a:stretch>
             <a:fillRect/>
           </a:stretch>
@@ -10745,7 +12635,7 @@
           <p:nvPr/>
         </p:nvPicPr>
         <p:blipFill>
-          <a:blip r:embed="rId4"/>
+          <a:blip r:embed="rId5"/>
           <a:stretch>
             <a:fillRect/>
           </a:stretch>
@@ -10775,7 +12665,7 @@
           <p:nvPr/>
         </p:nvPicPr>
         <p:blipFill>
-          <a:blip r:embed="rId5"/>
+          <a:blip r:embed="rId6"/>
           <a:stretch>
             <a:fillRect/>
           </a:stretch>

</xml_diff>